<commit_message>
Finalize lesson for Medina Lab
</commit_message>
<xml_diff>
--- a/reproducible_research.pptx
+++ b/reproducible_research.pptx
@@ -21,15 +21,6 @@
     <p:sldId id="269" r:id="rId15"/>
     <p:sldId id="270" r:id="rId16"/>
     <p:sldId id="271" r:id="rId17"/>
-    <p:sldId id="272" r:id="rId18"/>
-    <p:sldId id="273" r:id="rId19"/>
-    <p:sldId id="274" r:id="rId20"/>
-    <p:sldId id="275" r:id="rId21"/>
-    <p:sldId id="276" r:id="rId22"/>
-    <p:sldId id="277" r:id="rId23"/>
-    <p:sldId id="278" r:id="rId24"/>
-    <p:sldId id="279" r:id="rId25"/>
-    <p:sldId id="280" r:id="rId26"/>
   </p:sldIdLst>
   <p:sldSz cx="12192000" cy="6858000"/>
   <p:notesSz cx="6858000" cy="9144000"/>
@@ -5818,7 +5809,7 @@
             </a:pPr>
             <a:r>
               <a:rPr/>
-              <a:t>The Importance of Open and Reproducible Research</a:t>
+              <a:t>Intro to Open and Reproducible Research</a:t>
             </a:r>
           </a:p>
         </p:txBody>
@@ -5879,18 +5870,48 @@
       </p:grpSpPr>
       <p:sp>
         <p:nvSpPr>
-          <p:cNvPr id="3" name="Content Placeholder 2"/>
-          <p:cNvSpPr>
-            <a:spLocks noGrp="1"/>
-          </p:cNvSpPr>
-          <p:nvPr>
-            <p:ph idx="1"/>
+          <p:cNvPr id="4" name="Text Placeholder 3"/>
+          <p:cNvSpPr>
+            <a:spLocks noGrp="1"/>
+          </p:cNvSpPr>
+          <p:nvPr>
+            <p:ph idx="2" sz="half" type="body"/>
           </p:nvPr>
         </p:nvSpPr>
         <p:spPr/>
         <p:txBody>
           <a:bodyPr/>
           <a:lstStyle/>
+          <a:p>
+            <a:pPr lvl="0" indent="0" marL="0">
+              <a:buNone/>
+            </a:pPr>
+            <a:r>
+              <a:rPr/>
+              <a:t> ## Make a plan for managing data in each project - 2</a:t>
+            </a:r>
+          </a:p>
+          <a:p>
+            <a:pPr lvl="0"/>
+            <a:r>
+              <a:rPr/>
+              <a:t>Document everything</a:t>
+            </a:r>
+          </a:p>
+          <a:p>
+            <a:pPr lvl="0"/>
+            <a:r>
+              <a:rPr/>
+              <a:t>Explicitly tie your files together</a:t>
+            </a:r>
+          </a:p>
+          <a:p>
+            <a:pPr lvl="0"/>
+            <a:r>
+              <a:rPr/>
+              <a:t>Data management plans are now explicitly required by the NSF and other funding agencies!!! Gandrud Figure 2</a:t>
+            </a:r>
+          </a:p>
           <a:p>
             <a:pPr lvl="0" indent="0" marL="0">
               <a:spcBef>
@@ -5900,31 +5921,143 @@
             </a:pPr>
             <a:r>
               <a:rPr b="1"/>
-              <a:t>Reproducible Research Habits</a:t>
-            </a:r>
-          </a:p>
-          <a:p>
-            <a:pPr lvl="0" indent="0" marL="0">
-              <a:buNone/>
-            </a:pPr>
-            <a:r>
-              <a:rPr/>
-              <a:t>Good habits to get into as a student!</a:t>
-            </a:r>
-          </a:p>
-          <a:p>
-            <a:pPr lvl="0" indent="0" marL="0">
-              <a:buNone/>
-            </a:pPr>
+              <a:t>Keep an electronic (online) notebook</a:t>
+            </a:r>
+          </a:p>
+          <a:p>
+            <a:pPr lvl="0"/>
+            <a:r>
+              <a:rPr/>
+              <a:t>Document everything!!</a:t>
+            </a:r>
+          </a:p>
+          <a:p>
+            <a:pPr lvl="1"/>
+            <a:r>
+              <a:rPr/>
+              <a:t>repeat your own analysis!!</a:t>
+            </a:r>
+          </a:p>
+          <a:p>
+            <a:pPr lvl="1"/>
+            <a:r>
+              <a:rPr/>
+              <a:t>show others what you did</a:t>
+            </a:r>
+          </a:p>
+          <a:p>
+            <a:pPr lvl="0"/>
+            <a:r>
+              <a:rPr/>
+              <a:t>Dokuwiki is great (keeps things in plain text)</a:t>
+            </a:r>
+          </a:p>
+          <a:p>
+            <a:pPr lvl="0"/>
+            <a:r>
+              <a:rPr/>
+              <a:t>I now use GitHub and Rmarkdown notebooks</a:t>
+            </a:r>
+          </a:p>
+          <a:p>
+            <a:pPr lvl="0"/>
             <a:r>
               <a:rPr>
                 <a:hlinkClick r:id="rId2"/>
               </a:rPr>
-              <a:t>10 Things Every Graduate Student Should Do</a:t>
-            </a:r>
-            <a:r>
-              <a:rPr/>
-              <a:t> By Carly Strasser</a:t>
+              <a:t>Go open if you’re brave</a:t>
+            </a:r>
+          </a:p>
+          <a:p>
+            <a:pPr lvl="0" indent="0" marL="0">
+              <a:spcBef>
+                <a:spcPts val="3000"/>
+              </a:spcBef>
+              <a:buNone/>
+            </a:pPr>
+            <a:r>
+              <a:rPr b="1"/>
+              <a:t>Communicate Your Science</a:t>
+            </a:r>
+          </a:p>
+          <a:p>
+            <a:pPr lvl="0" indent="0" marL="0">
+              <a:buNone/>
+            </a:pPr>
+            <a:r>
+              <a:rPr/>
+              <a:t>Start doing outreach now!</a:t>
+            </a:r>
+          </a:p>
+          <a:p>
+            <a:pPr lvl="0" indent="0" marL="0">
+              <a:buNone/>
+            </a:pPr>
+            <a:r>
+              <a:rPr>
+                <a:hlinkClick r:id="rId3"/>
+              </a:rPr>
+              <a:t>NSF vs. House Committee on Science</a:t>
+            </a:r>
+          </a:p>
+        </p:txBody>
+      </p:sp>
+      <p:pic>
+        <p:nvPicPr>
+          <p:cNvPr descr="fig:  images/kqed.jpg" id="0" name="Picture 1"/>
+          <p:cNvPicPr>
+            <a:picLocks noGrp="1" noChangeAspect="1"/>
+          </p:cNvPicPr>
+          <p:nvPr/>
+        </p:nvPicPr>
+        <p:blipFill>
+          <a:blip r:embed="rId4"/>
+          <a:stretch>
+            <a:fillRect/>
+          </a:stretch>
+        </p:blipFill>
+        <p:spPr bwMode="auto">
+          <a:xfrm>
+            <a:off x="5041900" y="609600"/>
+            <a:ext cx="5372100" cy="4673600"/>
+          </a:xfrm>
+          <a:prstGeom prst="rect">
+            <a:avLst/>
+          </a:prstGeom>
+          <a:noFill/>
+          <a:ln w="9525">
+            <a:noFill/>
+            <a:headEnd/>
+            <a:tailEnd/>
+          </a:ln>
+        </p:spPr>
+      </p:pic>
+      <p:sp>
+        <p:nvSpPr>
+          <p:cNvPr id="1" name="TextBox 3"/>
+          <p:cNvSpPr txBox="1"/>
+          <p:nvPr/>
+        </p:nvSpPr>
+        <p:spPr>
+          <a:xfrm>
+            <a:off x="4648200" y="5283200"/>
+            <a:ext cx="6159500" cy="508000"/>
+          </a:xfrm>
+          <a:prstGeom prst="rect">
+            <a:avLst/>
+          </a:prstGeom>
+          <a:noFill/>
+        </p:spPr>
+        <p:txBody>
+          <a:bodyPr/>
+          <a:lstStyle/>
+          <a:p>
+            <a:pPr lvl="0" indent="0" marL="0" algn="ctr">
+              <a:buNone/>
+            </a:pPr>
+            <a:r>
+              <a:rPr/>
+              <a:t>Science Mistrust</a:t>
             </a:r>
           </a:p>
         </p:txBody>
@@ -5974,49 +6107,7 @@
             </a:pPr>
             <a:r>
               <a:rPr b="1"/>
-              <a:t>Stop Using Excel!</a:t>
-            </a:r>
-          </a:p>
-          <a:p>
-            <a:pPr lvl="0"/>
-            <a:r>
-              <a:rPr/>
-              <a:t>OK, maybe not entirely - its good for quick visualizing, data entry, etc.</a:t>
-            </a:r>
-          </a:p>
-          <a:p>
-            <a:pPr lvl="0"/>
-            <a:r>
-              <a:rPr/>
-              <a:t>It tends to be a crutch.</a:t>
-            </a:r>
-          </a:p>
-          <a:p>
-            <a:pPr lvl="1"/>
-            <a:r>
-              <a:rPr/>
-              <a:t>Stops you from thinking carefully about your data structure</a:t>
-            </a:r>
-          </a:p>
-          <a:p>
-            <a:pPr lvl="1"/>
-            <a:r>
-              <a:rPr/>
-              <a:t>Stops you from learning better ways to handle data</a:t>
-            </a:r>
-          </a:p>
-          <a:p>
-            <a:pPr lvl="0"/>
-            <a:r>
-              <a:rPr/>
-              <a:t>Proprietary software</a:t>
-            </a:r>
-          </a:p>
-          <a:p>
-            <a:pPr lvl="0"/>
-            <a:r>
-              <a:rPr/>
-              <a:t>Easy to mess up your data, no provenance</a:t>
+              <a:t>Publish Open-Access Articles</a:t>
             </a:r>
           </a:p>
           <a:p>
@@ -6025,14 +6116,110 @@
               <a:rPr>
                 <a:hlinkClick r:id="rId2"/>
               </a:rPr>
-              <a:t>Dates!</a:t>
-            </a:r>
-          </a:p>
-          <a:p>
-            <a:pPr lvl="0"/>
-            <a:r>
-              <a:rPr/>
-              <a:t>At least keep your raw data in text format</a:t>
+              <a:t>Biology Failed the Internet</a:t>
+            </a:r>
+          </a:p>
+          <a:p>
+            <a:pPr lvl="1"/>
+            <a:r>
+              <a:rPr/>
+              <a:t>Physics moved to pre-print servers a long time ago!</a:t>
+            </a:r>
+          </a:p>
+          <a:p>
+            <a:pPr lvl="1"/>
+            <a:r>
+              <a:rPr/>
+              <a:t>Open access journals (e.g. PLoS) were supposed to be a stop-gap measure!</a:t>
+            </a:r>
+          </a:p>
+          <a:p>
+            <a:pPr lvl="0"/>
+            <a:r>
+              <a:rPr/>
+              <a:t>Many schools now have open-access funds</a:t>
+            </a:r>
+          </a:p>
+          <a:p>
+            <a:pPr lvl="0"/>
+            <a:r>
+              <a:rPr>
+                <a:hlinkClick r:id="rId3"/>
+              </a:rPr>
+              <a:t>The dark side of open-access</a:t>
+            </a:r>
+          </a:p>
+          <a:p>
+            <a:pPr lvl="0"/>
+            <a:r>
+              <a:rPr/>
+              <a:t>Most journals only own the “typesetting” (because that is all they did!).</a:t>
+            </a:r>
+          </a:p>
+          <a:p>
+            <a:pPr lvl="1"/>
+            <a:r>
+              <a:rPr>
+                <a:hlinkClick r:id="rId4"/>
+              </a:rPr>
+              <a:t>Therefore you may legally post a pre-print</a:t>
+            </a:r>
+          </a:p>
+          <a:p>
+            <a:pPr lvl="1"/>
+            <a:r>
+              <a:rPr/>
+              <a:t>BiorXiv</a:t>
+            </a:r>
+          </a:p>
+          <a:p>
+            <a:pPr lvl="1"/>
+            <a:r>
+              <a:rPr/>
+              <a:t>PeerJ</a:t>
+            </a:r>
+          </a:p>
+          <a:p>
+            <a:pPr lvl="1"/>
+            <a:r>
+              <a:rPr/>
+              <a:t>Most universities now have pre-print platforms</a:t>
+            </a:r>
+          </a:p>
+          <a:p>
+            <a:pPr lvl="0"/>
+            <a:r>
+              <a:rPr/>
+              <a:t>ResearchGate, Academia.edu etc. are social networks whereby you are sharing articles with your “friends”</a:t>
+            </a:r>
+          </a:p>
+          <a:p>
+            <a:pPr lvl="0" indent="0" marL="0">
+              <a:spcBef>
+                <a:spcPts val="3000"/>
+              </a:spcBef>
+              <a:buNone/>
+            </a:pPr>
+            <a:r>
+              <a:rPr b="1"/>
+              <a:t>Rstudio</a:t>
+            </a:r>
+          </a:p>
+          <a:p>
+            <a:pPr lvl="0" indent="0" marL="0">
+              <a:buNone/>
+            </a:pPr>
+            <a:r>
+              <a:rPr/>
+              <a:t>R studio is an Integrated Developer Environment for R * Is an IDE (integrated development environment) that </a:t>
+            </a:r>
+            <a:r>
+              <a:rPr i="1"/>
+              <a:t>sits on top of</a:t>
+            </a:r>
+            <a:r>
+              <a:rPr/>
+              <a:t> R and makes it easier to interact with R. * Organizes your work in R in neatly-contained packages of work (typically data and code) called “projects” * Nothing mysterious about these—just collections of files stored together in a single directory on your computer.</a:t>
             </a:r>
           </a:p>
         </p:txBody>
@@ -6061,18 +6248,65 @@
       </p:grpSpPr>
       <p:sp>
         <p:nvSpPr>
-          <p:cNvPr id="3" name="Content Placeholder 2"/>
-          <p:cNvSpPr>
-            <a:spLocks noGrp="1"/>
-          </p:cNvSpPr>
-          <p:nvPr>
-            <p:ph idx="1"/>
-          </p:nvPr>
-        </p:nvSpPr>
-        <p:spPr/>
+          <p:cNvPr id="2" name="Title 1"/>
+          <p:cNvSpPr>
+            <a:spLocks noGrp="1"/>
+          </p:cNvSpPr>
+          <p:nvPr>
+            <p:ph type="title"/>
+          </p:nvPr>
+        </p:nvSpPr>
+        <p:spPr>
+          <a:xfrm>
+            <a:off x="685800" y="2074333"/>
+            <a:ext cx="3680885" cy="1371600"/>
+          </a:xfrm>
+        </p:spPr>
         <p:txBody>
           <a:bodyPr/>
           <a:lstStyle/>
+          <a:p>
+            <a:pPr lvl="0" indent="0" marL="0">
+              <a:buNone/>
+            </a:pPr>
+            <a:r>
+              <a:rPr/>
+              <a:t>Git and GitHub</a:t>
+            </a:r>
+          </a:p>
+        </p:txBody>
+      </p:sp>
+      <p:sp>
+        <p:nvSpPr>
+          <p:cNvPr id="4" name="Text Placeholder 3"/>
+          <p:cNvSpPr>
+            <a:spLocks noGrp="1"/>
+          </p:cNvSpPr>
+          <p:nvPr>
+            <p:ph idx="2" sz="half" type="body"/>
+          </p:nvPr>
+        </p:nvSpPr>
+        <p:spPr/>
+        <p:txBody>
+          <a:bodyPr/>
+          <a:lstStyle/>
+          <a:p>
+            <a:pPr lvl="0"/>
+            <a:r>
+              <a:rPr/>
+              <a:t>Thanks to </a:t>
+            </a:r>
+            <a:r>
+              <a:rPr>
+                <a:hlinkClick r:id="rId2"/>
+              </a:rPr>
+              <a:t>Eric Anderson</a:t>
+            </a:r>
+            <a:r>
+              <a:rPr/>
+              <a:t> for portions of the git/github part of this lecture Eric Anderson</a:t>
+            </a:r>
+          </a:p>
           <a:p>
             <a:pPr lvl="0" indent="0" marL="0">
               <a:spcBef>
@@ -6082,34 +6316,49 @@
             </a:pPr>
             <a:r>
               <a:rPr b="1"/>
-              <a:t>Learn to Code</a:t>
-            </a:r>
-          </a:p>
-          <a:p>
-            <a:pPr lvl="0" indent="0" marL="0">
-              <a:buNone/>
-            </a:pPr>
-            <a:r>
-              <a:rPr/>
-              <a:t>Any language.</a:t>
-            </a:r>
-          </a:p>
-          <a:p>
-            <a:pPr lvl="0" indent="0" marL="0">
-              <a:buNone/>
-            </a:pPr>
-            <a:r>
-              <a:rPr/>
-              <a:t>R is a great starting place.</a:t>
-            </a:r>
-          </a:p>
-          <a:p>
-            <a:pPr lvl="0" indent="0" marL="0">
-              <a:buNone/>
-            </a:pPr>
-            <a:r>
-              <a:rPr/>
-              <a:t>Here is code to paste cells from excel into an R data frame!</a:t>
+              <a:t>Git</a:t>
+            </a:r>
+          </a:p>
+          <a:p>
+            <a:pPr lvl="0"/>
+            <a:r>
+              <a:rPr/>
+              <a:t>A version control system, or VCS, tracks the history of changes as people and teams collaborate on projects together. As the project evolves, teams can run tests, fix bugs, and contribute new code with the confidence that any version can be recovered at any time. Developers can review project history to find out:</a:t>
+            </a:r>
+          </a:p>
+          <a:p>
+            <a:pPr lvl="1"/>
+            <a:r>
+              <a:rPr/>
+              <a:t>Which changes were made?</a:t>
+            </a:r>
+          </a:p>
+          <a:p>
+            <a:pPr lvl="1"/>
+            <a:r>
+              <a:rPr/>
+              <a:t>Who made the changes?</a:t>
+            </a:r>
+          </a:p>
+          <a:p>
+            <a:pPr lvl="1"/>
+            <a:r>
+              <a:rPr/>
+              <a:t>When were the changes made?</a:t>
+            </a:r>
+          </a:p>
+          <a:p>
+            <a:pPr lvl="1"/>
+            <a:r>
+              <a:rPr/>
+              <a:t>Why were changes needed?</a:t>
+            </a:r>
+          </a:p>
+          <a:p>
+            <a:pPr lvl="0"/>
+            <a:r>
+              <a:rPr/>
+              <a:t>All of this is stored as “commits” inside an invisible directory called .git</a:t>
             </a:r>
           </a:p>
           <a:p>
@@ -6120,82 +6369,286 @@
               <a:rPr>
                 <a:latin typeface="Courier"/>
               </a:rPr>
-              <a:t>data </a:t>
-            </a:r>
-            <a:r>
-              <a:rPr>
-                <a:solidFill>
-                  <a:srgbClr val="007020"/>
-                </a:solidFill>
-                <a:latin typeface="Courier"/>
-              </a:rPr>
-              <a:t>&lt;-</a:t>
-            </a:r>
+              <a:t>/reproducible_research/--% ls .git</a:t>
+            </a:r>
+            <a:br/>
             <a:r>
               <a:rPr>
                 <a:latin typeface="Courier"/>
               </a:rPr>
-              <a:t> </a:t>
-            </a:r>
-            <a:r>
-              <a:rPr>
-                <a:solidFill>
-                  <a:srgbClr val="06287E"/>
-                </a:solidFill>
-                <a:latin typeface="Courier"/>
-              </a:rPr>
-              <a:t>read.table</a:t>
-            </a:r>
+              <a:t>COMMIT_EDITMSG  config          hooks           info            objects         refs</a:t>
+            </a:r>
+            <a:br/>
             <a:r>
               <a:rPr>
                 <a:latin typeface="Courier"/>
               </a:rPr>
-              <a:t>(</a:t>
-            </a:r>
-            <a:r>
-              <a:rPr>
-                <a:solidFill>
-                  <a:srgbClr val="06287E"/>
-                </a:solidFill>
-                <a:latin typeface="Courier"/>
-              </a:rPr>
-              <a:t>pipe</a:t>
+              <a:t>HEAD            description     index           logs            packed-refs</a:t>
+            </a:r>
+          </a:p>
+          <a:p>
+            <a:pPr lvl="0" indent="0" marL="0">
+              <a:spcBef>
+                <a:spcPts val="3000"/>
+              </a:spcBef>
+              <a:buNone/>
+            </a:pPr>
+            <a:r>
+              <a:rPr b="1"/>
+              <a:t>A typical VCS for a non-computer programmer</a:t>
+            </a:r>
+          </a:p>
+          <a:p>
+            <a:pPr lvl="0"/>
+            <a:r>
+              <a:rPr/>
+              <a:t>Start writing </a:t>
             </a:r>
             <a:r>
               <a:rPr>
                 <a:latin typeface="Courier"/>
               </a:rPr>
-              <a:t>(</a:t>
-            </a:r>
-            <a:r>
-              <a:rPr>
-                <a:solidFill>
-                  <a:srgbClr val="4070A0"/>
-                </a:solidFill>
-                <a:latin typeface="Courier"/>
-              </a:rPr>
-              <a:t>"pbpaste"</a:t>
+              <a:t>my_manuscript.doc</a:t>
+            </a:r>
+            <a:r>
+              <a:rPr/>
+              <a:t>.</a:t>
+            </a:r>
+          </a:p>
+          <a:p>
+            <a:pPr lvl="0"/>
+            <a:r>
+              <a:rPr/>
+              <a:t>At some point worry that MS Word is going to eat your file, so,</a:t>
+            </a:r>
+          </a:p>
+          <a:p>
+            <a:pPr lvl="1"/>
+            <a:r>
+              <a:rPr/>
+              <a:t>Make a “backup” called </a:t>
             </a:r>
             <a:r>
               <a:rPr>
                 <a:latin typeface="Courier"/>
               </a:rPr>
-              <a:t>),</a:t>
-            </a:r>
-            <a:r>
-              <a:rPr>
-                <a:solidFill>
-                  <a:srgbClr val="7D9029"/>
-                </a:solidFill>
-                <a:latin typeface="Courier"/>
-              </a:rPr>
-              <a:t>header=</a:t>
+              <a:t>my_manuscript_A.doc</a:t>
+            </a:r>
+          </a:p>
+          <a:p>
+            <a:pPr lvl="0"/>
+            <a:r>
+              <a:rPr/>
+              <a:t>Then, before overhauling the discussion, save the current file as </a:t>
             </a:r>
             <a:r>
               <a:rPr>
                 <a:latin typeface="Courier"/>
               </a:rPr>
-              <a:t>T) </a:t>
+              <a:t>my_manuscript_B.doc</a:t>
+            </a:r>
+            <a:r>
+              <a:rPr/>
+              <a:t>.</a:t>
+            </a:r>
+          </a:p>
+          <a:p>
+            <a:pPr lvl="0"/>
+            <a:r>
+              <a:rPr/>
+              <a:t>Email it to your coauthors and then have a series of files with other extensions such as the initials of their names when they edit them and send them back.</a:t>
+            </a:r>
+          </a:p>
+          <a:p>
+            <a:pPr lvl="0"/>
+            <a:r>
+              <a:rPr/>
+              <a:t>Etc.</a:t>
+            </a:r>
+          </a:p>
+          <a:p>
+            <a:pPr lvl="0"/>
+            <a:r>
+              <a:rPr/>
+              <a:t>Disadvantages:</a:t>
+            </a:r>
+          </a:p>
+          <a:p>
+            <a:pPr lvl="1"/>
+            <a:r>
+              <a:rPr/>
+              <a:t>Hard to find a good record of what is in each version. (Wait! I liked the introduction I wrote three weeks ago…where is that now?)</a:t>
+            </a:r>
+          </a:p>
+          <a:p>
+            <a:pPr lvl="1"/>
+            <a:r>
+              <a:rPr/>
+              <a:t>A terrible system if you have multiple files that are dependent on one another</a:t>
+            </a:r>
+          </a:p>
+          <a:p>
+            <a:pPr lvl="1"/>
+            <a:r>
+              <a:rPr/>
+              <a:t>If you decide that you want to merge the changes you made to the discussion in version </a:t>
+            </a:r>
+            <a:r>
+              <a:rPr>
+                <a:latin typeface="Courier"/>
+              </a:rPr>
+              <a:t>_C</a:t>
+            </a:r>
+            <a:r>
+              <a:rPr/>
+              <a:t> with the edits on the introduction in version </a:t>
+            </a:r>
+            <a:r>
+              <a:rPr>
+                <a:latin typeface="Courier"/>
+              </a:rPr>
+              <a:t>_K</a:t>
+            </a:r>
+            <a:r>
+              <a:rPr/>
+              <a:t>, it is hard.</a:t>
+            </a:r>
+          </a:p>
+          <a:p>
+            <a:pPr lvl="0" indent="0" marL="0">
+              <a:spcBef>
+                <a:spcPts val="3000"/>
+              </a:spcBef>
+              <a:buNone/>
+            </a:pPr>
+            <a:r>
+              <a:rPr b="1"/>
+              <a:t>GitHub (and others) is a distributed version control system (DVCS)</a:t>
+            </a:r>
+          </a:p>
+          <a:p>
+            <a:pPr lvl="0"/>
+            <a:r>
+              <a:rPr/>
+              <a:t>Git stores “snapshots” of your collection of files in a repository, which can be stored on GitHub</a:t>
+            </a:r>
+          </a:p>
+          <a:p>
+            <a:pPr lvl="0"/>
+            <a:r>
+              <a:rPr/>
+              <a:t>For our work, the “collection of files” will be “the stuff in your RStudio project”</a:t>
+            </a:r>
+          </a:p>
+          <a:p>
+            <a:pPr lvl="1"/>
+            <a:r>
+              <a:rPr/>
+              <a:t>Another reason it is nice to keep everything you need for a project together in a “project directory”</a:t>
+            </a:r>
+          </a:p>
+          <a:p>
+            <a:pPr lvl="0"/>
+            <a:r>
+              <a:rPr/>
+              <a:t>When you clone or repository, </a:t>
+            </a:r>
+            <a:r>
+              <a:rPr b="1"/>
+              <a:t>you</a:t>
+            </a:r>
+            <a:r>
+              <a:rPr/>
+              <a:t> get the whole version history</a:t>
+            </a:r>
+          </a:p>
+          <a:p>
+            <a:pPr lvl="0"/>
+            <a:r>
+              <a:rPr/>
+              <a:t>When someone else clones that repository, </a:t>
+            </a:r>
+            <a:r>
+              <a:rPr b="1"/>
+              <a:t>they also</a:t>
+            </a:r>
+            <a:r>
+              <a:rPr/>
+              <a:t> get the whole version history.</a:t>
+            </a:r>
+          </a:p>
+          <a:p>
+            <a:pPr lvl="0"/>
+            <a:r>
+              <a:rPr/>
+              <a:t>Git has well-developed features for merging changes made in different repositories</a:t>
+            </a:r>
+          </a:p>
+          <a:p>
+            <a:pPr lvl="0"/>
+            <a:r>
+              <a:rPr/>
+              <a:t>Unlike once popular centralized version control systems (rcs, cvs, subversion), DVCSs like GitHub don’t need a constant connection to a central repository. Developers can work anywhere and collaborate asynchronously from any time zone.</a:t>
+            </a:r>
+          </a:p>
+        </p:txBody>
+      </p:sp>
+      <p:pic>
+        <p:nvPicPr>
+          <p:cNvPr descr="fig:  images/github_dvcs.jpg" id="0" name="Picture 1"/>
+          <p:cNvPicPr>
+            <a:picLocks noGrp="1" noChangeAspect="1"/>
+          </p:cNvPicPr>
+          <p:nvPr/>
+        </p:nvPicPr>
+        <p:blipFill>
+          <a:blip r:embed="rId3"/>
+          <a:stretch>
+            <a:fillRect/>
+          </a:stretch>
+        </p:blipFill>
+        <p:spPr bwMode="auto">
+          <a:xfrm>
+            <a:off x="4826000" y="609600"/>
+            <a:ext cx="5816600" cy="4673600"/>
+          </a:xfrm>
+          <a:prstGeom prst="rect">
+            <a:avLst/>
+          </a:prstGeom>
+          <a:noFill/>
+          <a:ln w="9525">
+            <a:noFill/>
+            <a:headEnd/>
+            <a:tailEnd/>
+          </a:ln>
+        </p:spPr>
+      </p:pic>
+      <p:sp>
+        <p:nvSpPr>
+          <p:cNvPr id="1" name="TextBox 3"/>
+          <p:cNvSpPr txBox="1"/>
+          <p:nvPr/>
+        </p:nvSpPr>
+        <p:spPr>
+          <a:xfrm>
+            <a:off x="4648200" y="5283200"/>
+            <a:ext cx="6159500" cy="508000"/>
+          </a:xfrm>
+          <a:prstGeom prst="rect">
+            <a:avLst/>
+          </a:prstGeom>
+          <a:noFill/>
+        </p:spPr>
+        <p:txBody>
+          <a:bodyPr/>
+          <a:lstStyle/>
+          <a:p>
+            <a:pPr lvl="0" indent="0" marL="0" algn="ctr">
+              <a:buNone/>
+            </a:pPr>
+            <a:r>
+              <a:rPr/>
+              <a:t>Github DVCS</a:t>
             </a:r>
           </a:p>
         </p:txBody>
@@ -6245,28 +6698,47 @@
             </a:pPr>
             <a:r>
               <a:rPr b="1"/>
-              <a:t>Make a plan for managing data in each project</a:t>
-            </a:r>
-          </a:p>
-          <a:p>
-            <a:pPr lvl="0"/>
-            <a:r>
-              <a:rPr/>
-              <a:t>Keep all data (and ideally analyses) in a text file</a:t>
-            </a:r>
-          </a:p>
-          <a:p>
-            <a:pPr lvl="0"/>
-            <a:r>
-              <a:rPr/>
-              <a:t>Think about your file structure</a:t>
+              <a:t>GitHub (and others) is a distributed version control system (DVCS)</a:t>
+            </a:r>
+          </a:p>
+          <a:p>
+            <a:pPr lvl="0"/>
+            <a:r>
+              <a:rPr/>
+              <a:t>Git and a DVCS system allow multiple people to work on multiple versions (“branches”) of a piece of software at the same time, without breaking the main branch. This approach can be used to add features or fix bugs.</a:t>
+            </a:r>
+          </a:p>
+          <a:p>
+            <a:pPr lvl="0"/>
+            <a:r>
+              <a:rPr/>
+              <a:t>To eliminate unnecessary work, Git and other VCSs give each contributor a unified and consistent view of a project, surfacing work that’s already in progress. Seeing a transparent history of changes, who made them, and how they contribute to the development of a project helps team members stay aligned while working independently.</a:t>
+            </a:r>
+          </a:p>
+          <a:p>
+            <a:pPr lvl="0"/>
+            <a:r>
+              <a:rPr/>
+              <a:t>Without version control, team members are subject to redundant tasks, slower timelines, and multiple copies of a single project.</a:t>
+            </a:r>
+          </a:p>
+          <a:p>
+            <a:pPr lvl="0" indent="0" marL="0">
+              <a:spcBef>
+                <a:spcPts val="3000"/>
+              </a:spcBef>
+              <a:buNone/>
+            </a:pPr>
+            <a:r>
+              <a:rPr b="1"/>
+              <a:t>GitHub Example for Software</a:t>
             </a:r>
           </a:p>
         </p:txBody>
       </p:sp>
       <p:pic>
         <p:nvPicPr>
-          <p:cNvPr descr="fig:  images/gandrud_1.png" id="0" name="Picture 1"/>
+          <p:cNvPr descr="fig:  images/gitflow.png" id="0" name="Picture 1"/>
           <p:cNvPicPr>
             <a:picLocks noGrp="1" noChangeAspect="1"/>
           </p:cNvPicPr>
@@ -6280,8 +6752,8 @@
         </p:blipFill>
         <p:spPr bwMode="auto">
           <a:xfrm>
-            <a:off x="4648200" y="1422400"/>
-            <a:ext cx="6159500" cy="3048000"/>
+            <a:off x="4648200" y="1397000"/>
+            <a:ext cx="6159500" cy="3098800"/>
           </a:xfrm>
           <a:prstGeom prst="rect">
             <a:avLst/>
@@ -6319,7 +6791,7 @@
             </a:pPr>
             <a:r>
               <a:rPr/>
-              <a:t>Gandrud Figure 1</a:t>
+              <a:t>The Github Flow</a:t>
             </a:r>
           </a:p>
         </p:txBody>
@@ -6348,12 +6820,12 @@
       </p:grpSpPr>
       <p:sp>
         <p:nvSpPr>
-          <p:cNvPr id="3" name="Content Placeholder 2"/>
-          <p:cNvSpPr>
-            <a:spLocks noGrp="1"/>
-          </p:cNvSpPr>
-          <p:nvPr>
-            <p:ph idx="1"/>
+          <p:cNvPr id="4" name="Text Placeholder 3"/>
+          <p:cNvSpPr>
+            <a:spLocks noGrp="1"/>
+          </p:cNvSpPr>
+          <p:nvPr>
+            <p:ph idx="2" sz="half" type="body"/>
           </p:nvPr>
         </p:nvSpPr>
         <p:spPr/>
@@ -6369,28 +6841,178 @@
             </a:pPr>
             <a:r>
               <a:rPr b="1"/>
-              <a:t>Make a plan for managing data in each project - 2</a:t>
-            </a:r>
-          </a:p>
-          <a:p>
-            <a:pPr lvl="0"/>
-            <a:r>
-              <a:rPr/>
-              <a:t>Document everything</a:t>
-            </a:r>
-          </a:p>
-          <a:p>
-            <a:pPr lvl="0"/>
-            <a:r>
-              <a:rPr/>
-              <a:t>Explicitly tie your files together</a:t>
-            </a:r>
-          </a:p>
-          <a:p>
-            <a:pPr lvl="0"/>
-            <a:r>
-              <a:rPr/>
-              <a:t>Data management plans are now explicitly required by the NSF and other funding agencies!!! Gandrud Figure 2</a:t>
+              <a:t>What’s a repository?</a:t>
+            </a:r>
+          </a:p>
+          <a:p>
+            <a:pPr lvl="0"/>
+            <a:r>
+              <a:rPr/>
+              <a:t>A </a:t>
+            </a:r>
+            <a:r>
+              <a:rPr i="1"/>
+              <a:t>repository</a:t>
+            </a:r>
+            <a:r>
+              <a:rPr/>
+              <a:t>, or </a:t>
+            </a:r>
+            <a:r>
+              <a:rPr>
+                <a:hlinkClick r:id="rId2"/>
+              </a:rPr>
+              <a:t>Git</a:t>
+            </a:r>
+            <a:r>
+              <a:rPr/>
+              <a:t> project, encompasses the entire collection of files and folders associated with a project (i.e. a directory), </a:t>
+            </a:r>
+            <a:r>
+              <a:rPr i="1"/>
+              <a:t>along with each file’s revision history</a:t>
+            </a:r>
+            <a:r>
+              <a:rPr/>
+              <a:t>.</a:t>
+            </a:r>
+          </a:p>
+          <a:p>
+            <a:pPr lvl="0"/>
+            <a:r>
+              <a:rPr/>
+              <a:t>The file history appears as snapshots in time called </a:t>
+            </a:r>
+            <a:r>
+              <a:rPr i="1"/>
+              <a:t>commits</a:t>
+            </a:r>
+            <a:r>
+              <a:rPr/>
+              <a:t>, and can be organized into multiple lines of development called branches.</a:t>
+            </a:r>
+          </a:p>
+          <a:p>
+            <a:pPr lvl="0"/>
+            <a:r>
+              <a:rPr/>
+              <a:t>Because Github is a DVCS, repositories are self-contained units and anyone who owns a copy of the repository can access the entire codebase and its history.</a:t>
+            </a:r>
+          </a:p>
+          <a:p>
+            <a:pPr lvl="0"/>
+            <a:r>
+              <a:rPr/>
+              <a:t>Using the command line or other ease-of-use interfaces, a git repository also allows for: interaction with the history, cloning, creating branches, committing, merging, comparing changes across versions of code, and more.</a:t>
+            </a:r>
+          </a:p>
+          <a:p>
+            <a:pPr lvl="0" indent="0" marL="0">
+              <a:spcBef>
+                <a:spcPts val="3000"/>
+              </a:spcBef>
+              <a:buNone/>
+            </a:pPr>
+            <a:r>
+              <a:rPr b="1"/>
+              <a:t>What’s a repository?</a:t>
+            </a:r>
+          </a:p>
+          <a:p>
+            <a:pPr lvl="0"/>
+            <a:r>
+              <a:rPr/>
+              <a:t>Working in repositories keeps development projects organized and protected. Developers are encouraged to fix bugs, or create fresh features, without fear of derailing mainline development efforts.</a:t>
+            </a:r>
+          </a:p>
+          <a:p>
+            <a:pPr lvl="0"/>
+            <a:r>
+              <a:rPr/>
+              <a:t>Through platforms like GitHub, Git also provides more opportunities for project transparency and collaboration. Public repositories help teams work together to build the best possible final product.</a:t>
+            </a:r>
+          </a:p>
+          <a:p>
+            <a:pPr lvl="0" indent="0" marL="0">
+              <a:spcBef>
+                <a:spcPts val="3000"/>
+              </a:spcBef>
+              <a:buNone/>
+            </a:pPr>
+            <a:r>
+              <a:rPr b="1"/>
+              <a:t>The Github Flow</a:t>
+            </a:r>
+          </a:p>
+          <a:p>
+            <a:pPr lvl="0" indent="0" marL="0">
+              <a:buNone/>
+            </a:pPr>
+            <a:r>
+              <a:rPr>
+                <a:hlinkClick r:id="rId3"/>
+              </a:rPr>
+              <a:t>Video</a:t>
+            </a:r>
+          </a:p>
+        </p:txBody>
+      </p:sp>
+      <p:pic>
+        <p:nvPicPr>
+          <p:cNvPr descr="fig:  images/github_flow.jpg" id="0" name="Picture 1"/>
+          <p:cNvPicPr>
+            <a:picLocks noGrp="1" noChangeAspect="1"/>
+          </p:cNvPicPr>
+          <p:nvPr/>
+        </p:nvPicPr>
+        <p:blipFill>
+          <a:blip r:embed="rId4"/>
+          <a:stretch>
+            <a:fillRect/>
+          </a:stretch>
+        </p:blipFill>
+        <p:spPr bwMode="auto">
+          <a:xfrm>
+            <a:off x="4711700" y="609600"/>
+            <a:ext cx="6045200" cy="4673600"/>
+          </a:xfrm>
+          <a:prstGeom prst="rect">
+            <a:avLst/>
+          </a:prstGeom>
+          <a:noFill/>
+          <a:ln w="9525">
+            <a:noFill/>
+            <a:headEnd/>
+            <a:tailEnd/>
+          </a:ln>
+        </p:spPr>
+      </p:pic>
+      <p:sp>
+        <p:nvSpPr>
+          <p:cNvPr id="1" name="TextBox 3"/>
+          <p:cNvSpPr txBox="1"/>
+          <p:nvPr/>
+        </p:nvSpPr>
+        <p:spPr>
+          <a:xfrm>
+            <a:off x="4648200" y="5283200"/>
+            <a:ext cx="6159500" cy="508000"/>
+          </a:xfrm>
+          <a:prstGeom prst="rect">
+            <a:avLst/>
+          </a:prstGeom>
+          <a:noFill/>
+        </p:spPr>
+        <p:txBody>
+          <a:bodyPr/>
+          <a:lstStyle/>
+          <a:p>
+            <a:pPr lvl="0" indent="0" marL="0" algn="ctr">
+              <a:buNone/>
+            </a:pPr>
+            <a:r>
+              <a:rPr/>
+              <a:t>The Github Flow</a:t>
             </a:r>
           </a:p>
         </p:txBody>
@@ -6440,51 +7062,112 @@
             </a:pPr>
             <a:r>
               <a:rPr b="1"/>
-              <a:t>Keep an electronic (online) notebook</a:t>
-            </a:r>
-          </a:p>
-          <a:p>
-            <a:pPr lvl="0"/>
-            <a:r>
-              <a:rPr/>
-              <a:t>Document everything!!</a:t>
-            </a:r>
-          </a:p>
-          <a:p>
-            <a:pPr lvl="1"/>
-            <a:r>
-              <a:rPr/>
-              <a:t>repeat your own analysis!!</a:t>
-            </a:r>
-          </a:p>
-          <a:p>
-            <a:pPr lvl="1"/>
-            <a:r>
-              <a:rPr/>
-              <a:t>show others what you did</a:t>
-            </a:r>
-          </a:p>
-          <a:p>
-            <a:pPr lvl="0"/>
-            <a:r>
-              <a:rPr/>
-              <a:t>Dokuwiki is great (keeps things in plain text)</a:t>
-            </a:r>
-          </a:p>
-          <a:p>
-            <a:pPr lvl="0"/>
-            <a:r>
-              <a:rPr/>
-              <a:t>I now use GitHub and Rmarkdown notebooks</a:t>
-            </a:r>
-          </a:p>
-          <a:p>
-            <a:pPr lvl="0"/>
-            <a:r>
-              <a:rPr>
-                <a:hlinkClick r:id="rId2"/>
-              </a:rPr>
-              <a:t>Go open if you’re brave</a:t>
+              <a:t>The GitHub Flow</a:t>
+            </a:r>
+          </a:p>
+          <a:p>
+            <a:pPr lvl="0" indent="0" marL="0">
+              <a:buNone/>
+            </a:pPr>
+            <a:r>
+              <a:rPr/>
+              <a:t>The GitHub flow has six steps, each with distinct benefits when implemented:</a:t>
+            </a:r>
+          </a:p>
+          <a:p>
+            <a:pPr lvl="0"/>
+            <a:r>
+              <a:rPr/>
+              <a:t>Create a branch:Topic branches created from the canonical deployment branch (usually master) allow teams to contribute to many parallel efforts. Short-lived topic branches, in particular, keep teams focused and results in quick ships.</a:t>
+            </a:r>
+          </a:p>
+          <a:p>
+            <a:pPr lvl="0"/>
+            <a:r>
+              <a:rPr/>
+              <a:t>Add commits:Snapshots of development efforts within a branch create safe, revertible points in the project’s history.</a:t>
+            </a:r>
+          </a:p>
+          <a:p>
+            <a:pPr lvl="0"/>
+            <a:r>
+              <a:rPr/>
+              <a:t>Open a pull request:Pull requests publicize a project’s ongoing efforts and set the tone for a transparent development process.</a:t>
+            </a:r>
+          </a:p>
+          <a:p>
+            <a:pPr lvl="0" indent="0" marL="0">
+              <a:spcBef>
+                <a:spcPts val="3000"/>
+              </a:spcBef>
+              <a:buNone/>
+            </a:pPr>
+            <a:r>
+              <a:rPr b="1"/>
+              <a:t>The GitHub Flow</a:t>
+            </a:r>
+          </a:p>
+          <a:p>
+            <a:pPr lvl="0"/>
+            <a:r>
+              <a:rPr/>
+              <a:t>Discuss and review code:Teams participate in code reviews by commenting, testing, and reviewing open pull requests. Code review is at the core of an open and participatory culture.</a:t>
+            </a:r>
+          </a:p>
+          <a:p>
+            <a:pPr lvl="0"/>
+            <a:r>
+              <a:rPr/>
+              <a:t>Merge:Upon clicking merge, GitHub automatically performs the equivalent of a local ‘git merge’ operation. GitHub also keeps the entire branch development history on the merged pull request.</a:t>
+            </a:r>
+          </a:p>
+          <a:p>
+            <a:pPr lvl="0"/>
+            <a:r>
+              <a:rPr/>
+              <a:t>Deploy:Teams can choose the best release cycles or incorporate continuous integration tools and operate with the assurance that code on the deployment branch has gone through a robust workflow.</a:t>
+            </a:r>
+          </a:p>
+          <a:p>
+            <a:pPr lvl="0" indent="0" marL="0">
+              <a:spcBef>
+                <a:spcPts val="3000"/>
+              </a:spcBef>
+              <a:buNone/>
+            </a:pPr>
+            <a:r>
+              <a:rPr b="1"/>
+              <a:t>Alternatives to Github exist!</a:t>
+            </a:r>
+          </a:p>
+          <a:p>
+            <a:pPr lvl="0"/>
+            <a:r>
+              <a:rPr/>
+              <a:t>Bitbucket</a:t>
+            </a:r>
+          </a:p>
+          <a:p>
+            <a:pPr lvl="0"/>
+            <a:r>
+              <a:rPr/>
+              <a:t>Gitlab</a:t>
+            </a:r>
+          </a:p>
+          <a:p>
+            <a:pPr lvl="0"/>
+            <a:r>
+              <a:rPr/>
+              <a:t>Gitbucket</a:t>
+            </a:r>
+          </a:p>
+          <a:p>
+            <a:pPr lvl="0" indent="0" marL="0">
+              <a:buNone/>
+            </a:pPr>
+            <a:r>
+              <a:rPr/>
+              <a:t>All work on a “freemium” model in which they provide free service to low-end users (like us), but charge for services needed by power users (like private repositories, more file storage space)</a:t>
             </a:r>
           </a:p>
         </p:txBody>
@@ -6513,12 +7196,37 @@
       </p:grpSpPr>
       <p:sp>
         <p:nvSpPr>
-          <p:cNvPr id="4" name="Text Placeholder 3"/>
-          <p:cNvSpPr>
-            <a:spLocks noGrp="1"/>
-          </p:cNvSpPr>
-          <p:nvPr>
-            <p:ph idx="2" sz="half" type="body"/>
+          <p:cNvPr id="2" name="Title 1"/>
+          <p:cNvSpPr>
+            <a:spLocks noGrp="1"/>
+          </p:cNvSpPr>
+          <p:nvPr>
+            <p:ph type="title"/>
+          </p:nvPr>
+        </p:nvSpPr>
+        <p:spPr/>
+        <p:txBody>
+          <a:bodyPr/>
+          <a:lstStyle/>
+          <a:p>
+            <a:pPr lvl="0" indent="0" marL="0">
+              <a:buNone/>
+            </a:pPr>
+            <a:r>
+              <a:rPr/>
+              <a:t>GitHub Tutorial</a:t>
+            </a:r>
+          </a:p>
+        </p:txBody>
+      </p:sp>
+      <p:sp>
+        <p:nvSpPr>
+          <p:cNvPr id="3" name="Content Placeholder 2"/>
+          <p:cNvSpPr>
+            <a:spLocks noGrp="1"/>
+          </p:cNvSpPr>
+          <p:nvPr>
+            <p:ph idx="1"/>
           </p:nvPr>
         </p:nvSpPr>
         <p:spPr/>
@@ -6534,127 +7242,33 @@
             </a:pPr>
             <a:r>
               <a:rPr b="1"/>
-              <a:t>Communicate Your Science</a:t>
-            </a:r>
-          </a:p>
-          <a:p>
-            <a:pPr lvl="0" indent="0" marL="0">
-              <a:buNone/>
+              <a:t>Do this in GitHub</a:t>
+            </a:r>
+          </a:p>
+          <a:p>
+            <a:pPr lvl="0" indent="-457200" marL="457200">
+              <a:buAutoNum type="arabicPeriod"/>
             </a:pPr>
             <a:r>
               <a:rPr/>
-              <a:t>Start doing outreach now!</a:t>
-            </a:r>
-          </a:p>
-          <a:p>
-            <a:pPr lvl="0" indent="0" marL="0">
-              <a:buNone/>
-            </a:pPr>
+              <a:t>Go to </a:t>
+            </a:r>
             <a:r>
               <a:rPr>
                 <a:hlinkClick r:id="rId2"/>
               </a:rPr>
-              <a:t>NSF vs. House Committee on Science</a:t>
-            </a:r>
-          </a:p>
-        </p:txBody>
-      </p:sp>
-      <p:pic>
-        <p:nvPicPr>
-          <p:cNvPr descr="fig:  images/kqed.jpg" id="0" name="Picture 1"/>
-          <p:cNvPicPr>
-            <a:picLocks noGrp="1" noChangeAspect="1"/>
-          </p:cNvPicPr>
-          <p:nvPr/>
-        </p:nvPicPr>
-        <p:blipFill>
-          <a:blip r:embed="rId3"/>
-          <a:stretch>
-            <a:fillRect/>
-          </a:stretch>
-        </p:blipFill>
-        <p:spPr bwMode="auto">
-          <a:xfrm>
-            <a:off x="5041900" y="609600"/>
-            <a:ext cx="5372100" cy="4673600"/>
-          </a:xfrm>
-          <a:prstGeom prst="rect">
-            <a:avLst/>
-          </a:prstGeom>
-          <a:noFill/>
-          <a:ln w="9525">
-            <a:noFill/>
-            <a:headEnd/>
-            <a:tailEnd/>
-          </a:ln>
-        </p:spPr>
-      </p:pic>
-      <p:sp>
-        <p:nvSpPr>
-          <p:cNvPr id="1" name="TextBox 3"/>
-          <p:cNvSpPr txBox="1"/>
-          <p:nvPr/>
-        </p:nvSpPr>
-        <p:spPr>
-          <a:xfrm>
-            <a:off x="4648200" y="5283200"/>
-            <a:ext cx="6159500" cy="508000"/>
-          </a:xfrm>
-          <a:prstGeom prst="rect">
-            <a:avLst/>
-          </a:prstGeom>
-          <a:noFill/>
-        </p:spPr>
-        <p:txBody>
-          <a:bodyPr/>
-          <a:lstStyle/>
-          <a:p>
-            <a:pPr lvl="0" indent="0" marL="0" algn="ctr">
-              <a:buNone/>
+              <a:t>https://github.com/ericcrandall/reproducible_research</a:t>
+            </a:r>
+          </a:p>
+          <a:p>
+            <a:pPr lvl="0" indent="-457200" marL="457200">
+              <a:buAutoNum type="arabicPeriod"/>
             </a:pPr>
             <a:r>
               <a:rPr/>
-              <a:t>Science Mistrust</a:t>
-            </a:r>
-          </a:p>
-        </p:txBody>
-      </p:sp>
-    </p:spTree>
-  </p:cSld>
-</p:sld>
-</file>
-
-<file path=ppt/slides/slide17.xml><?xml version="1.0" encoding="utf-8"?>
-<p:sld xmlns:a="http://schemas.openxmlformats.org/drawingml/2006/main" xmlns:r="http://schemas.openxmlformats.org/officeDocument/2006/relationships" xmlns:p="http://schemas.openxmlformats.org/presentationml/2006/main">
-  <p:cSld>
-    <p:spTree>
-      <p:nvGrpSpPr>
-        <p:cNvPr id="1" name=""/>
-        <p:cNvGrpSpPr/>
-        <p:nvPr/>
-      </p:nvGrpSpPr>
-      <p:grpSpPr>
-        <a:xfrm>
-          <a:off x="0" y="0"/>
-          <a:ext cx="0" cy="0"/>
-          <a:chOff x="0" y="0"/>
-          <a:chExt cx="0" cy="0"/>
-        </a:xfrm>
-      </p:grpSpPr>
-      <p:sp>
-        <p:nvSpPr>
-          <p:cNvPr id="3" name="Content Placeholder 2"/>
-          <p:cNvSpPr>
-            <a:spLocks noGrp="1"/>
-          </p:cNvSpPr>
-          <p:nvPr>
-            <p:ph idx="1"/>
-          </p:nvPr>
-        </p:nvSpPr>
-        <p:spPr/>
-        <p:txBody>
-          <a:bodyPr/>
-          <a:lstStyle/>
+              <a:t>Click “Fork” in the upper right-hand corner and follow dialogue prompts to create fork in your account</a:t>
+            </a:r>
+          </a:p>
           <a:p>
             <a:pPr lvl="0" indent="0" marL="0">
               <a:spcBef>
@@ -6664,130 +7278,120 @@
             </a:pPr>
             <a:r>
               <a:rPr b="1"/>
-              <a:t>Publish Open-Access Articles</a:t>
-            </a:r>
-          </a:p>
-          <a:p>
-            <a:pPr lvl="0"/>
+              <a:t>Do This in RStudio</a:t>
+            </a:r>
+          </a:p>
+          <a:p>
+            <a:pPr lvl="0" indent="-457200" marL="457200">
+              <a:buAutoNum type="arabicPeriod"/>
+            </a:pPr>
+            <a:r>
+              <a:rPr/>
+              <a:t>Select File -&gt; New Project</a:t>
+            </a:r>
+          </a:p>
+          <a:p>
+            <a:pPr lvl="0" indent="-457200" marL="457200">
+              <a:buAutoNum type="arabicPeriod"/>
+            </a:pPr>
+            <a:r>
+              <a:rPr/>
+              <a:t>Create project from: Choose “Version Control”</a:t>
+            </a:r>
+          </a:p>
+          <a:p>
+            <a:pPr lvl="1" indent="-457200" marL="914400">
+              <a:buAutoNum type="arabicPeriod"/>
+            </a:pPr>
+            <a:r>
+              <a:rPr/>
+              <a:t>Choose “Git”</a:t>
+            </a:r>
+          </a:p>
+          <a:p>
+            <a:pPr lvl="1" indent="-457200" marL="914400">
+              <a:buAutoNum type="arabicPeriod"/>
+            </a:pPr>
+            <a:r>
+              <a:rPr/>
+              <a:t>Input the url of this repository 1.https://github.com/</a:t>
+            </a:r>
+            <a:r>
+              <a:rPr i="1"/>
+              <a:t>yourusername</a:t>
+            </a:r>
+            <a:r>
+              <a:rPr/>
+              <a:t>/reproducible_research</a:t>
+            </a:r>
+          </a:p>
+          <a:p>
+            <a:pPr lvl="1" indent="-457200" marL="914400">
+              <a:buAutoNum type="arabicPeriod"/>
+            </a:pPr>
+            <a:r>
+              <a:rPr/>
+              <a:t>and put it somewhere</a:t>
+            </a:r>
+          </a:p>
+          <a:p>
+            <a:pPr lvl="1" indent="-457200" marL="914400">
+              <a:buAutoNum type="arabicPeriod"/>
+            </a:pPr>
+            <a:r>
+              <a:rPr/>
+              <a:t>I suggest a repository coming off your home directory called </a:t>
+            </a:r>
             <a:r>
               <a:rPr>
-                <a:hlinkClick r:id="rId2"/>
+                <a:latin typeface="Courier"/>
               </a:rPr>
-              <a:t>Biology Failed the Internet</a:t>
-            </a:r>
-          </a:p>
-          <a:p>
-            <a:pPr lvl="1"/>
-            <a:r>
-              <a:rPr/>
-              <a:t>Physics moved to pre-print servers a long time ago!</a:t>
-            </a:r>
-          </a:p>
-          <a:p>
-            <a:pPr lvl="1"/>
-            <a:r>
-              <a:rPr/>
-              <a:t>Open access journals (e.g. PLoS) were supposed to be a stop-gap measure!</a:t>
-            </a:r>
-          </a:p>
-          <a:p>
-            <a:pPr lvl="0"/>
-            <a:r>
-              <a:rPr/>
-              <a:t>Many schools now have open-access funds</a:t>
-            </a:r>
-          </a:p>
-          <a:p>
-            <a:pPr lvl="0"/>
+              <a:t>github</a:t>
+            </a:r>
+            <a:r>
+              <a:rPr/>
+              <a:t>.</a:t>
+            </a:r>
+          </a:p>
+          <a:p>
+            <a:pPr lvl="1" indent="-457200" marL="914400">
+              <a:buAutoNum type="arabicPeriod"/>
+            </a:pPr>
+            <a:r>
+              <a:rPr/>
+              <a:t>(browse to where you want to put it in the “create project as subdirectory of:”)</a:t>
+            </a:r>
+          </a:p>
+          <a:p>
+            <a:pPr lvl="1" indent="-457200" marL="914400">
+              <a:buAutoNum type="arabicPeriod"/>
+            </a:pPr>
+            <a:r>
+              <a:rPr/>
+              <a:t>So it should be in </a:t>
+            </a:r>
             <a:r>
               <a:rPr>
-                <a:hlinkClick r:id="rId3"/>
+                <a:latin typeface="Courier"/>
               </a:rPr>
-              <a:t>The dark side of open-access</a:t>
-            </a:r>
-          </a:p>
-          <a:p>
-            <a:pPr lvl="0"/>
-            <a:r>
-              <a:rPr/>
-              <a:t>Most journals only own the “typesetting” (because that is all they did!).</a:t>
-            </a:r>
-          </a:p>
-          <a:p>
-            <a:pPr lvl="1"/>
+              <a:t>yourhome/github/reproducible_research</a:t>
+            </a:r>
+          </a:p>
+          <a:p>
+            <a:pPr lvl="1" indent="-457200" marL="914400">
+              <a:buAutoNum type="arabicPeriod"/>
+            </a:pPr>
+            <a:r>
+              <a:rPr/>
+              <a:t>Hit </a:t>
+            </a:r>
             <a:r>
               <a:rPr>
-                <a:hlinkClick r:id="rId4"/>
+                <a:latin typeface="Courier"/>
               </a:rPr>
-              <a:t>Therefore you may legally post a pre-print</a:t>
-            </a:r>
-          </a:p>
-          <a:p>
-            <a:pPr lvl="1"/>
-            <a:r>
-              <a:rPr/>
-              <a:t>BiorXiv</a:t>
-            </a:r>
-          </a:p>
-          <a:p>
-            <a:pPr lvl="1"/>
-            <a:r>
-              <a:rPr/>
-              <a:t>PeerJ</a:t>
-            </a:r>
-          </a:p>
-          <a:p>
-            <a:pPr lvl="1"/>
-            <a:r>
-              <a:rPr/>
-              <a:t>Most universities now have pre-print platforms</a:t>
-            </a:r>
-          </a:p>
-          <a:p>
-            <a:pPr lvl="0"/>
-            <a:r>
-              <a:rPr/>
-              <a:t>ResearchGate, Academia.edu etc. are social networks whereby you are sharing articles with your “friends”</a:t>
-            </a:r>
-          </a:p>
-        </p:txBody>
-      </p:sp>
-    </p:spTree>
-  </p:cSld>
-</p:sld>
-</file>
-
-<file path=ppt/slides/slide18.xml><?xml version="1.0" encoding="utf-8"?>
-<p:sld xmlns:a="http://schemas.openxmlformats.org/drawingml/2006/main" xmlns:r="http://schemas.openxmlformats.org/officeDocument/2006/relationships" xmlns:p="http://schemas.openxmlformats.org/presentationml/2006/main">
-  <p:cSld>
-    <p:spTree>
-      <p:nvGrpSpPr>
-        <p:cNvPr id="1" name=""/>
-        <p:cNvGrpSpPr/>
-        <p:nvPr/>
-      </p:nvGrpSpPr>
-      <p:grpSpPr>
-        <a:xfrm>
-          <a:off x="0" y="0"/>
-          <a:ext cx="0" cy="0"/>
-          <a:chOff x="0" y="0"/>
-          <a:chExt cx="0" cy="0"/>
-        </a:xfrm>
-      </p:grpSpPr>
-      <p:sp>
-        <p:nvSpPr>
-          <p:cNvPr id="3" name="Content Placeholder 2"/>
-          <p:cNvSpPr>
-            <a:spLocks noGrp="1"/>
-          </p:cNvSpPr>
-          <p:nvPr>
-            <p:ph idx="1"/>
-          </p:nvPr>
-        </p:nvSpPr>
-        <p:spPr/>
-        <p:txBody>
-          <a:bodyPr/>
-          <a:lstStyle/>
+              <a:t>Create Project</a:t>
+            </a:r>
+          </a:p>
           <a:p>
             <a:pPr lvl="0" indent="0" marL="0">
               <a:spcBef>
@@ -6797,122 +7401,996 @@
             </a:pPr>
             <a:r>
               <a:rPr b="1"/>
-              <a:t>Rstudio</a:t>
+              <a:t>The status/staging panel</a:t>
+            </a:r>
+          </a:p>
+          <a:p>
+            <a:pPr lvl="0"/>
+            <a:r>
+              <a:rPr/>
+              <a:t>RStudio keeps git constantly scanning the project directory to find any files that have changed or which are new.</a:t>
+            </a:r>
+          </a:p>
+          <a:p>
+            <a:pPr lvl="0"/>
+            <a:r>
+              <a:rPr/>
+              <a:t>By clicking a file’s little “check-box” you can stage it.</a:t>
+            </a:r>
+            <a:br/>
+          </a:p>
+          <a:p>
+            <a:pPr lvl="0"/>
+            <a:r>
+              <a:rPr/>
+              <a:t>Some symbols:</a:t>
+            </a:r>
+          </a:p>
+          <a:p>
+            <a:pPr lvl="1"/>
+            <a:r>
+              <a:rPr b="1"/>
+              <a:t>Blue-M</a:t>
+            </a:r>
+            <a:r>
+              <a:rPr/>
+              <a:t>: a file that is already under version control that has been modified.</a:t>
+            </a:r>
+          </a:p>
+          <a:p>
+            <a:pPr lvl="1"/>
+            <a:r>
+              <a:rPr b="1"/>
+              <a:t>Yellow-?</a:t>
+            </a:r>
+            <a:r>
+              <a:rPr/>
+              <a:t>: a file that is not under version control (yet…)</a:t>
+            </a:r>
+          </a:p>
+          <a:p>
+            <a:pPr lvl="1"/>
+            <a:r>
+              <a:rPr b="1"/>
+              <a:t>Green-A</a:t>
+            </a:r>
+            <a:r>
+              <a:rPr/>
+              <a:t>: a file that was not under version control, but which has been staged to be committed.</a:t>
+            </a:r>
+          </a:p>
+          <a:p>
+            <a:pPr lvl="1"/>
+            <a:r>
+              <a:rPr b="1"/>
+              <a:t>Red-D</a:t>
+            </a:r>
+            <a:r>
+              <a:rPr/>
+              <a:t>: a file under version control has been deleted. To make it really disappear, you have to stage its disappearance and commit.</a:t>
+            </a:r>
+          </a:p>
+          <a:p>
+            <a:pPr lvl="1"/>
+            <a:r>
+              <a:rPr b="1"/>
+              <a:t>Purple-R</a:t>
+            </a:r>
+            <a:r>
+              <a:rPr/>
+              <a:t> a file that was renamed. (Note that git in Rstudio seems to be figuring this out on its own.)</a:t>
             </a:r>
           </a:p>
           <a:p>
             <a:pPr lvl="0" indent="0" marL="0">
+              <a:spcBef>
+                <a:spcPts val="3000"/>
+              </a:spcBef>
               <a:buNone/>
             </a:pPr>
             <a:r>
-              <a:rPr/>
-              <a:t>R studio is an Integrated Developer Environment for R * Is an IDE (integrated development environment) that </a:t>
-            </a:r>
+              <a:rPr b="1"/>
+              <a:t>Staging Files</a:t>
+            </a:r>
+          </a:p>
+          <a:p>
+            <a:pPr lvl="0"/>
+            <a:r>
+              <a:rPr/>
+              <a:t>You can click the check box next to various files to stage them to be part of a commit.</a:t>
+            </a:r>
+          </a:p>
+          <a:p>
+            <a:pPr lvl="1"/>
+            <a:r>
+              <a:rPr/>
+              <a:t>I generally stage all changes for every commit</a:t>
+            </a:r>
+          </a:p>
+          <a:p>
+            <a:pPr lvl="1"/>
+            <a:r>
+              <a:rPr/>
+              <a:t>But one could conceive of being more strategic…</a:t>
+            </a:r>
+          </a:p>
+          <a:p>
+            <a:pPr lvl="1"/>
+            <a:r>
+              <a:rPr/>
+              <a:t>at the command line, staging or adding all files to a commit is achieved by:</a:t>
+            </a:r>
+          </a:p>
+          <a:p>
+            <a:pPr lvl="0" indent="0">
+              <a:buNone/>
+            </a:pPr>
+            <a:r>
+              <a:rPr>
+                <a:solidFill>
+                  <a:srgbClr val="06287E"/>
+                </a:solidFill>
+                <a:latin typeface="Courier"/>
+              </a:rPr>
+              <a:t>git</a:t>
+            </a:r>
+            <a:r>
+              <a:rPr>
+                <a:latin typeface="Courier"/>
+              </a:rPr>
+              <a:t> add .</a:t>
+            </a:r>
+          </a:p>
+          <a:p>
+            <a:pPr lvl="0" indent="0" marL="0">
+              <a:spcBef>
+                <a:spcPts val="3000"/>
+              </a:spcBef>
+              <a:buNone/>
+            </a:pPr>
+            <a:r>
+              <a:rPr b="1"/>
+              <a:t>The Commit window</a:t>
+            </a:r>
+          </a:p>
+          <a:p>
+            <a:pPr lvl="0"/>
+            <a:r>
+              <a:rPr/>
+              <a:t>Click “commit” to reach the commit window</a:t>
+            </a:r>
+          </a:p>
+          <a:p>
+            <a:pPr lvl="0"/>
+            <a:r>
+              <a:rPr/>
+              <a:t>Shows a “diff” of your changes.</a:t>
+            </a:r>
+          </a:p>
+          <a:p>
+            <a:pPr lvl="0"/>
+            <a:r>
+              <a:rPr/>
+              <a:t>In other words, what has changed between the last committed version of a file and its current state.</a:t>
+            </a:r>
+          </a:p>
+          <a:p>
+            <a:pPr lvl="0"/>
+            <a:r>
+              <a:rPr/>
+              <a:t>Green = additions, red = deletions</a:t>
+            </a:r>
+          </a:p>
+          <a:p>
+            <a:pPr lvl="0"/>
+            <a:r>
+              <a:rPr/>
+              <a:t>Holy smokes this is convenient</a:t>
+            </a:r>
+          </a:p>
+          <a:p>
+            <a:pPr lvl="0"/>
+            <a:r>
+              <a:rPr/>
+              <a:t>(Note: all this output is available from the command line, but the Rstudio interface is very nice, IMHO)</a:t>
+            </a:r>
+          </a:p>
+          <a:p>
+            <a:pPr lvl="0" indent="0" marL="0">
+              <a:spcBef>
+                <a:spcPts val="3000"/>
+              </a:spcBef>
+              <a:buNone/>
+            </a:pPr>
+            <a:r>
+              <a:rPr b="1"/>
+              <a:t>Making a Commit</a:t>
+            </a:r>
+          </a:p>
+          <a:p>
+            <a:pPr lvl="0"/>
+            <a:r>
+              <a:rPr/>
+              <a:t>Super easy:</a:t>
+            </a:r>
+          </a:p>
+          <a:p>
+            <a:pPr lvl="1"/>
+            <a:r>
+              <a:rPr/>
+              <a:t>After staging the files you want to commit…</a:t>
+            </a:r>
+          </a:p>
+          <a:p>
+            <a:pPr lvl="1"/>
+            <a:r>
+              <a:rPr/>
+              <a:t>Write a brief message (first line short, then as much after that as you want) and hit the commit button.</a:t>
+            </a:r>
+          </a:p>
+          <a:p>
+            <a:pPr lvl="0"/>
+            <a:r>
+              <a:rPr/>
+              <a:t>Tradition is to use present tense when describing your changes.</a:t>
+            </a:r>
+          </a:p>
+          <a:p>
+            <a:pPr lvl="1"/>
+            <a:r>
+              <a:rPr/>
+              <a:t>as in “Add new data file, update file slurping code”</a:t>
+            </a:r>
+          </a:p>
+          <a:p>
+            <a:pPr lvl="0"/>
+            <a:r>
+              <a:rPr/>
+              <a:t>This can be really handy when trying to find where you made an error!</a:t>
+            </a:r>
+          </a:p>
+          <a:p>
+            <a:pPr lvl="0"/>
+            <a:r>
+              <a:rPr/>
+              <a:t>Spending a little time to write informative commit messages can pay off.</a:t>
+            </a:r>
+          </a:p>
+          <a:p>
+            <a:pPr lvl="0"/>
+            <a:r>
+              <a:rPr/>
+              <a:t>At the command line, a commit is achieved thusly:</a:t>
+            </a:r>
+          </a:p>
+          <a:p>
+            <a:pPr lvl="0" indent="0">
+              <a:buNone/>
+            </a:pPr>
+            <a:r>
+              <a:rPr>
+                <a:solidFill>
+                  <a:srgbClr val="06287E"/>
+                </a:solidFill>
+                <a:latin typeface="Courier"/>
+              </a:rPr>
+              <a:t>git</a:t>
+            </a:r>
+            <a:r>
+              <a:rPr>
+                <a:latin typeface="Courier"/>
+              </a:rPr>
+              <a:t> commit </a:t>
+            </a:r>
+            <a:r>
+              <a:rPr>
+                <a:solidFill>
+                  <a:srgbClr val="7D9029"/>
+                </a:solidFill>
+                <a:latin typeface="Courier"/>
+              </a:rPr>
+              <a:t>-m</a:t>
+            </a:r>
+            <a:r>
+              <a:rPr>
+                <a:latin typeface="Courier"/>
+              </a:rPr>
+              <a:t> </a:t>
+            </a:r>
+            <a:r>
+              <a:rPr>
+                <a:solidFill>
+                  <a:srgbClr val="4070A0"/>
+                </a:solidFill>
+                <a:latin typeface="Courier"/>
+              </a:rPr>
+              <a:t>"my commit message"</a:t>
+            </a:r>
+          </a:p>
+          <a:p>
+            <a:pPr lvl="0" indent="0" marL="0">
+              <a:spcBef>
+                <a:spcPts val="3000"/>
+              </a:spcBef>
+              <a:buNone/>
+            </a:pPr>
+            <a:r>
+              <a:rPr b="1"/>
+              <a:t>The History window</a:t>
+            </a:r>
+          </a:p>
+          <a:p>
+            <a:pPr lvl="0"/>
+            <a:r>
+              <a:rPr/>
+              <a:t>Easy inspection of past commits.</a:t>
+            </a:r>
+          </a:p>
+          <a:p>
+            <a:pPr lvl="0"/>
+            <a:r>
+              <a:rPr/>
+              <a:t>See what changes were made at each commit.</a:t>
+            </a:r>
+          </a:p>
+          <a:p>
+            <a:pPr lvl="0"/>
+            <a:r>
+              <a:rPr/>
+              <a:t>At the command line you can see this with</a:t>
+            </a:r>
+          </a:p>
+          <a:p>
+            <a:pPr lvl="0" indent="0">
+              <a:buNone/>
+            </a:pPr>
+            <a:r>
+              <a:rPr>
+                <a:solidFill>
+                  <a:srgbClr val="06287E"/>
+                </a:solidFill>
+                <a:latin typeface="Courier"/>
+              </a:rPr>
+              <a:t>git</a:t>
+            </a:r>
+            <a:r>
+              <a:rPr>
+                <a:latin typeface="Courier"/>
+              </a:rPr>
+              <a:t> log</a:t>
+            </a:r>
+          </a:p>
+          <a:p>
+            <a:pPr lvl="0" indent="0" marL="0">
+              <a:spcBef>
+                <a:spcPts val="3000"/>
+              </a:spcBef>
+              <a:buNone/>
+            </a:pPr>
+            <a:r>
+              <a:rPr b="1"/>
+              <a:t>How does git store and keep track of things</a:t>
+            </a:r>
+          </a:p>
+          <a:p>
+            <a:pPr lvl="0"/>
+            <a:r>
+              <a:rPr/>
+              <a:t>Everything is stored in the .git folder inside the RStudio project.</a:t>
+            </a:r>
+          </a:p>
+          <a:p>
+            <a:pPr lvl="0"/>
+            <a:r>
+              <a:rPr/>
+              <a:t>The “working copy” gets checkout out of there</a:t>
+            </a:r>
+          </a:p>
+          <a:p>
+            <a:pPr lvl="0"/>
+            <a:r>
+              <a:rPr/>
+              <a:t>Committed changes are recorded to the directory</a:t>
+            </a:r>
+          </a:p>
+          <a:p>
+            <a:pPr lvl="0" indent="0" marL="0">
+              <a:spcBef>
+                <a:spcPts val="3000"/>
+              </a:spcBef>
+              <a:buNone/>
+            </a:pPr>
+            <a:r>
+              <a:rPr b="1"/>
+              <a:t>What is inside of the .git directory?</a:t>
+            </a:r>
+          </a:p>
+          <a:p>
+            <a:pPr lvl="0" indent="0" marL="0">
+              <a:buNone/>
+            </a:pPr>
+            <a:r>
+              <a:rPr/>
+              <a:t>We can use R to list the files.</a:t>
+            </a:r>
+          </a:p>
+          <a:p>
+            <a:pPr lvl="0" indent="0">
+              <a:buNone/>
+            </a:pPr>
+            <a:r>
+              <a:rPr i="1">
+                <a:solidFill>
+                  <a:srgbClr val="60A0B0"/>
+                </a:solidFill>
+                <a:latin typeface="Courier"/>
+              </a:rPr>
+              <a:t># check out this file-system command in R</a:t>
+            </a:r>
+            <a:br/>
+            <a:r>
+              <a:rPr>
+                <a:solidFill>
+                  <a:srgbClr val="06287E"/>
+                </a:solidFill>
+                <a:latin typeface="Courier"/>
+              </a:rPr>
+              <a:t>dir</a:t>
+            </a:r>
+            <a:r>
+              <a:rPr>
+                <a:latin typeface="Courier"/>
+              </a:rPr>
+              <a:t>(</a:t>
+            </a:r>
+            <a:r>
+              <a:rPr>
+                <a:solidFill>
+                  <a:srgbClr val="7D9029"/>
+                </a:solidFill>
+                <a:latin typeface="Courier"/>
+              </a:rPr>
+              <a:t>path =</a:t>
+            </a:r>
+            <a:r>
+              <a:rPr>
+                <a:latin typeface="Courier"/>
+              </a:rPr>
+              <a:t> </a:t>
+            </a:r>
+            <a:r>
+              <a:rPr>
+                <a:solidFill>
+                  <a:srgbClr val="4070A0"/>
+                </a:solidFill>
+                <a:latin typeface="Courier"/>
+              </a:rPr>
+              <a:t>".git"</a:t>
+            </a:r>
+            <a:r>
+              <a:rPr>
+                <a:latin typeface="Courier"/>
+              </a:rPr>
+              <a:t>, </a:t>
+            </a:r>
+            <a:r>
+              <a:rPr>
+                <a:solidFill>
+                  <a:srgbClr val="7D9029"/>
+                </a:solidFill>
+                <a:latin typeface="Courier"/>
+              </a:rPr>
+              <a:t>all.files =</a:t>
+            </a:r>
+            <a:r>
+              <a:rPr>
+                <a:latin typeface="Courier"/>
+              </a:rPr>
+              <a:t> </a:t>
+            </a:r>
+            <a:r>
+              <a:rPr>
+                <a:solidFill>
+                  <a:srgbClr val="880000"/>
+                </a:solidFill>
+                <a:latin typeface="Courier"/>
+              </a:rPr>
+              <a:t>TRUE</a:t>
+            </a:r>
+            <a:r>
+              <a:rPr>
+                <a:latin typeface="Courier"/>
+              </a:rPr>
+              <a:t>, </a:t>
+            </a:r>
+            <a:r>
+              <a:rPr>
+                <a:solidFill>
+                  <a:srgbClr val="7D9029"/>
+                </a:solidFill>
+                <a:latin typeface="Courier"/>
+              </a:rPr>
+              <a:t>recursive =</a:t>
+            </a:r>
+            <a:r>
+              <a:rPr>
+                <a:latin typeface="Courier"/>
+              </a:rPr>
+              <a:t> </a:t>
+            </a:r>
+            <a:r>
+              <a:rPr>
+                <a:solidFill>
+                  <a:srgbClr val="880000"/>
+                </a:solidFill>
+                <a:latin typeface="Courier"/>
+              </a:rPr>
+              <a:t>TRUE</a:t>
+            </a:r>
+            <a:r>
+              <a:rPr>
+                <a:latin typeface="Courier"/>
+              </a:rPr>
+              <a:t>)</a:t>
+            </a:r>
+          </a:p>
+          <a:p>
+            <a:pPr lvl="0" indent="0">
+              <a:buNone/>
+            </a:pPr>
+            <a:r>
+              <a:rPr>
+                <a:latin typeface="Courier"/>
+              </a:rPr>
+              <a:t>##  [1] "COMMIT_EDITMSG"                                                 
+##  [2] "config"                                                         
+##  [3] "description"                                                    
+##  [4] "HEAD"                                                           
+##  [5] "hooks/applypatch-msg.sample"                                    
+##  [6] "hooks/commit-msg.sample"                                        
+##  [7] "hooks/fsmonitor-watchman.sample"                                
+##  [8] "hooks/post-update.sample"                                       
+##  [9] "hooks/pre-applypatch.sample"                                    
+## [10] "hooks/pre-commit.sample"                                        
+## [11] "hooks/pre-merge-commit.sample"                                  
+## [12] "hooks/pre-push.sample"                                          
+## [13] "hooks/pre-rebase.sample"                                        
+## [14] "hooks/pre-receive.sample"                                       
+## [15] "hooks/prepare-commit-msg.sample"                                
+## [16] "hooks/push-to-checkout.sample"                                  
+## [17] "hooks/update.sample"                                            
+## [18] "index"                                                          
+## [19] "info/exclude"                                                   
+## [20] "logs/HEAD"                                                      
+## [21] "logs/refs/heads/main"                                           
+## [22] "logs/refs/remotes/origin/HEAD"                                  
+## [23] "logs/refs/remotes/origin/main"                                  
+## [24] "objects/00/f53ce8066a38abfe40f99ffb0a445aa32b8011"              
+## [25] "objects/02/70d3cbc9f83e4c2eb1e11d0a147c31e5a644c0"              
+## [26] "objects/10/c739a3d513015f61e52b5d978604f9d0d8f291"              
+## [27] "objects/11/bcf458a321651e68c7627ef6890bafccef0b18"              
+## [28] "objects/13/23e55fd16b1e4f7965bacc0223492a178de5dd"              
+## [29] "objects/16/a9cdea4ad9456d9f9c661f24a9a3eb57e689c6"              
+## [30] "objects/19/85083191e8b2f5505f36625f7edcb1a0d6412f"              
+## [31] "objects/1f/3ede9a9f986201addf75b29e70fa8c2a8477f9"              
+## [32] "objects/21/f7e34c7ff8b756b03724b544f5e2ce2b9b082f"              
+## [33] "objects/23/f63b97abe22805008c32a9658bfc895538b6aa"              
+## [34] "objects/24/f75cad5b119c80678c244d47312d0ad02fc670"              
+## [35] "objects/26/2b2cfc8ba24c825f6b64acbe3ca395b7ff2f31"              
+## [36] "objects/28/f0057bd3f9d33a7ace7e366f7ffa4dc210f944"              
+## [37] "objects/2a/c44c9b964f841a8a24cc396a7fb2876b8e8aa5"              
+## [38] "objects/2c/ad0aa1a595ebf0779e1388933dac6b412a7114"              
+## [39] "objects/36/548b376ebcc447a10b93353cd9b1dc0b259b06"              
+## [40] "objects/37/2f57b5b80902a0eb6202670cb509eb321be2be"              
+## [41] "objects/3d/3116d6bc440e1415d17474676199ffb85f545f"              
+## [42] "objects/50/45808a94d041c6f6b785bf9c7fcc6ca550d3eb"              
+## [43] "objects/51/6fb82804f5d310f7e3e16b9138291527f0fd2a"              
+## [44] "objects/66/c1d3e45021859c6a7d5bf4b6a5f4c8fd0ce340"              
+## [45] "objects/70/1f64ed543adeb4a93909fb7db24076c7ff0590"              
+## [46] "objects/70/e9f8bc14094dfe37e0994c17dbbb536a3a3d48"              
+## [47] "objects/7b/3778658c5a9060a506261167781e5d18c33841"              
+## [48] "objects/80/70e6a38cc8a0742e7c13872f8ef41b644528c7"              
+## [49] "objects/81/17a4006e63621d735764ad2d51daa41a8ed605"              
+## [50] "objects/83/002948bce0dcb03b633293a58dc2a776bf88ef"              
+## [51] "objects/86/5d5629ef55987fe68127c149a3c5050ab237d0"              
+## [52] "objects/8e/3c2ebc99e2e337f7d69948b93529a437590b27"              
+## [53] "objects/96/f3bba4fe892703a8e364e79e08cc07721eccd5"              
+## [54] "objects/99/1898f18b7e0fc860e99e701e8ffceeb8ad2ed9"              
+## [55] "objects/bc/746a8952dc080a92ad1157f4280792168b1b87"              
+## [56] "objects/c8/959054c5e1331ea7170c3d94c487563782269a"              
+## [57] "objects/cb/b99a7196a266cb4e958f2bfc031bf478422080"              
+## [58] "objects/cd/dcc43841aa35f5553ab949d7c98f640074c576"              
+## [59] "objects/d0/603c55847f6fb92b975f6c989f4f24a7ffe131"              
+## [60] "objects/d0/63e8bc7af719bae7c8eb42a8bc12891480f305"              
+## [61] "objects/d2/11a25fb11a40ea713785f8e91c066682ca8e87"              
+## [62] "objects/d2/23b29197c549e12c83368d039f791fd74c3f93"              
+## [63] "objects/d4/c50d6843671ed282ae1d42d314c2edf01a8d76"              
+## [64] "objects/e7/cdfc9e85df4a28de8208cb8fff47fa8880ec97"              
+## [65] "objects/e8/a26260ce3b15f4349b41e19fc96f4ac05db927"              
+## [66] "objects/ea/0cbadfc24142a0ab84ef1ca35c5badf5f9318e"              
+## [67] "objects/ed/de644a9bc63ad2e7adafb59ab3f161c237673e"              
+## [68] "objects/f6/2cd7ba4a791cccad8b3ba40b15e023803be5a3"              
+## [69] "objects/f9/bac9fa4535cde8e9166a09ed4cc091aa4255b0"              
+## [70] "objects/fd/94b1c9d48ef9cbf72354a4eb9c57e923619b70"              
+## [71] "objects/fe/34adfb051b10b4fe9552744c72059ede597991"              
+## [72] "objects/pack/pack-73ddbaccd0bd543cfe129a05ce137348072fa9db.idx" 
+## [73] "objects/pack/pack-73ddbaccd0bd543cfe129a05ce137348072fa9db.pack"
+## [74] "packed-refs"                                                    
+## [75] "refs/heads/main"                                                
+## [76] "refs/remotes/origin/HEAD"                                       
+## [77] "refs/remotes/origin/main"</a:t>
+            </a:r>
+          </a:p>
+          <a:p>
+            <a:pPr lvl="0" indent="0" marL="0">
+              <a:buNone/>
+            </a:pPr>
             <a:r>
               <a:rPr i="1"/>
-              <a:t>sits on top of</a:t>
-            </a:r>
-            <a:r>
-              <a:rPr/>
-              <a:t> R and makes it easier to interact with R. * Organizes your work in R in neatly-contained packages of work (typically data and code) called “projects” * Nothing mysterious about these—just collections of files stored together in a single directory on your computer.</a:t>
-            </a:r>
-          </a:p>
-        </p:txBody>
-      </p:sp>
-    </p:spTree>
-  </p:cSld>
-</p:sld>
-</file>
-
-<file path=ppt/slides/slide19.xml><?xml version="1.0" encoding="utf-8"?>
-<p:sld xmlns:a="http://schemas.openxmlformats.org/drawingml/2006/main" xmlns:r="http://schemas.openxmlformats.org/officeDocument/2006/relationships" xmlns:p="http://schemas.openxmlformats.org/presentationml/2006/main">
-  <p:cSld>
-    <p:spTree>
-      <p:nvGrpSpPr>
-        <p:cNvPr id="1" name=""/>
-        <p:cNvGrpSpPr/>
-        <p:nvPr/>
-      </p:nvGrpSpPr>
-      <p:grpSpPr>
-        <a:xfrm>
-          <a:off x="0" y="0"/>
-          <a:ext cx="0" cy="0"/>
-          <a:chOff x="0" y="0"/>
-          <a:chExt cx="0" cy="0"/>
-        </a:xfrm>
-      </p:grpSpPr>
-      <p:sp>
-        <p:nvSpPr>
-          <p:cNvPr id="2" name="Title 1"/>
-          <p:cNvSpPr>
-            <a:spLocks noGrp="1"/>
-          </p:cNvSpPr>
-          <p:nvPr>
-            <p:ph type="title"/>
-          </p:nvPr>
-        </p:nvSpPr>
-        <p:spPr/>
-        <p:txBody>
-          <a:bodyPr/>
-          <a:lstStyle/>
+              <a:t>Yikes!</a:t>
+            </a:r>
+          </a:p>
           <a:p>
             <a:pPr lvl="0" indent="0" marL="0">
+              <a:spcBef>
+                <a:spcPts val="3000"/>
+              </a:spcBef>
               <a:buNone/>
             </a:pPr>
             <a:r>
-              <a:rPr/>
-              <a:t>Git</a:t>
-            </a:r>
-          </a:p>
-        </p:txBody>
-      </p:sp>
-      <p:sp>
-        <p:nvSpPr>
-          <p:cNvPr id="3" name="Content Placeholder 2"/>
-          <p:cNvSpPr>
-            <a:spLocks noGrp="1"/>
-          </p:cNvSpPr>
-          <p:nvPr>
-            <p:ph idx="1"/>
-          </p:nvPr>
-        </p:nvSpPr>
-        <p:spPr/>
-        <p:txBody>
-          <a:bodyPr/>
-          <a:lstStyle/>
-          <a:p>
-            <a:pPr lvl="0"/>
-            <a:r>
-              <a:rPr/>
-              <a:t>A version control system, or VCS, tracks the history of changes as people and teams collaborate on projects together. As the project evolves, teams can run tests, fix bugs, and contribute new code with the confidence that any version can be recovered at any time. Developers can review project history to find out:</a:t>
+              <a:rPr b="1"/>
+              <a:t>How does git know a file has changed?</a:t>
+            </a:r>
+          </a:p>
+          <a:p>
+            <a:pPr lvl="0"/>
+            <a:r>
+              <a:rPr/>
+              <a:t>Does it just look at the modification date?</a:t>
+            </a:r>
+          </a:p>
+          <a:p>
+            <a:pPr lvl="0"/>
+            <a:r>
+              <a:rPr/>
+              <a:t>NO! It “fingerprints” every file, so it knows when it has changed from the most recent committed version.</a:t>
             </a:r>
           </a:p>
           <a:p>
             <a:pPr lvl="1"/>
             <a:r>
               <a:rPr/>
-              <a:t>Which changes were made?</a:t>
+              <a:t>Demonstration. Change a file. Save, then undo the change and save again…Git knows the file has been changed back to its “former self”</a:t>
+            </a:r>
+          </a:p>
+          <a:p>
+            <a:pPr lvl="0"/>
+            <a:r>
+              <a:rPr/>
+              <a:t>SHA-1 hashes.</a:t>
+            </a:r>
+          </a:p>
+          <a:p>
+            <a:pPr lvl="0"/>
+            <a:r>
+              <a:rPr/>
+              <a:t>You will see things like </a:t>
+            </a:r>
+            <a:r>
+              <a:rPr>
+                <a:latin typeface="Courier"/>
+              </a:rPr>
+              <a:t>ed00c10ae6cf7bcc35d335d2edad7e71bc0f6770</a:t>
+            </a:r>
+            <a:r>
+              <a:rPr/>
+              <a:t> all over in Git-land.</a:t>
+            </a:r>
+          </a:p>
+          <a:p>
+            <a:pPr lvl="0"/>
+            <a:r>
+              <a:rPr/>
+              <a:t>You can treat them as very specific names for different commits.</a:t>
+            </a:r>
+          </a:p>
+          <a:p>
+            <a:pPr lvl="0" indent="0" marL="0">
+              <a:spcBef>
+                <a:spcPts val="3000"/>
+              </a:spcBef>
+              <a:buNone/>
+            </a:pPr>
+            <a:r>
+              <a:rPr b="1"/>
+              <a:t>How can I make git ignore certain files?</a:t>
+            </a:r>
+          </a:p>
+          <a:p>
+            <a:pPr lvl="0"/>
+            <a:r>
+              <a:rPr/>
+              <a:t>The </a:t>
+            </a:r>
+            <a:r>
+              <a:rPr>
+                <a:latin typeface="Courier"/>
+              </a:rPr>
+              <a:t>.gitignore</a:t>
+            </a:r>
+            <a:r>
+              <a:rPr/>
+              <a:t> file!</a:t>
+            </a:r>
+          </a:p>
+          <a:p>
+            <a:pPr lvl="0"/>
+            <a:r>
+              <a:rPr/>
+              <a:t>File names (and patterns) in the </a:t>
+            </a:r>
+            <a:r>
+              <a:rPr>
+                <a:latin typeface="Courier"/>
+              </a:rPr>
+              <a:t>.gitignore</a:t>
+            </a:r>
+            <a:r>
+              <a:rPr/>
+              <a:t> file are ignored </a:t>
+            </a:r>
+            <a:r>
+              <a:rPr i="1"/>
+              <a:t>recursively</a:t>
+            </a:r>
+            <a:r>
+              <a:rPr/>
+              <a:t> (down into subdirectories), by default.</a:t>
+            </a:r>
+          </a:p>
+          <a:p>
+            <a:pPr lvl="0"/>
+            <a:r>
+              <a:rPr/>
+              <a:t>Files won’t be ignored if they are already in the repository.</a:t>
+            </a:r>
+          </a:p>
+          <a:p>
+            <a:pPr lvl="0"/>
+            <a:r>
+              <a:rPr/>
+              <a:t>Example: </a:t>
+            </a:r>
+            <a:r>
+              <a:rPr>
+                <a:latin typeface="Courier"/>
+              </a:rPr>
+              <a:t>*.html</a:t>
+            </a:r>
+            <a:r>
+              <a:rPr/>
+              <a:t> ## Go for it everyone! Git to playing</a:t>
+            </a:r>
+          </a:p>
+          <a:p>
+            <a:pPr lvl="0"/>
+            <a:r>
+              <a:rPr/>
+              <a:t>Make some changes and commit them yourselves.</a:t>
+            </a:r>
+            <a:br/>
+          </a:p>
+          <a:p>
+            <a:pPr lvl="0"/>
+            <a:r>
+              <a:rPr/>
+              <a:t>Add some new files to the project, and commit those.</a:t>
+            </a:r>
+          </a:p>
+          <a:p>
+            <a:pPr lvl="0"/>
+            <a:r>
+              <a:rPr/>
+              <a:t>Get familiar with the diff window.</a:t>
+            </a:r>
+          </a:p>
+          <a:p>
+            <a:pPr lvl="0"/>
+            <a:r>
+              <a:rPr/>
+              <a:t>Check the history after a few commits.</a:t>
+            </a:r>
+          </a:p>
+          <a:p>
+            <a:pPr lvl="0" indent="0" marL="0">
+              <a:spcBef>
+                <a:spcPts val="3000"/>
+              </a:spcBef>
+              <a:buNone/>
+            </a:pPr>
+            <a:r>
+              <a:rPr b="1"/>
+              <a:t>Intro to Rmarkdown</a:t>
+            </a:r>
+          </a:p>
+          <a:p>
+            <a:pPr lvl="0"/>
+            <a:r>
+              <a:rPr/>
+              <a:t>Designed as a text </a:t>
+            </a:r>
+            <a:r>
+              <a:rPr i="1"/>
+              <a:t>markup</a:t>
+            </a:r>
+            <a:r>
+              <a:rPr/>
+              <a:t> language that would be</a:t>
             </a:r>
           </a:p>
           <a:p>
             <a:pPr lvl="1"/>
             <a:r>
               <a:rPr/>
-              <a:t>Who made the changes?</a:t>
+              <a:t>Simple</a:t>
             </a:r>
           </a:p>
           <a:p>
             <a:pPr lvl="1"/>
             <a:r>
               <a:rPr/>
-              <a:t>When were the changes made?</a:t>
+              <a:t>Expressive</a:t>
             </a:r>
           </a:p>
           <a:p>
             <a:pPr lvl="1"/>
             <a:r>
               <a:rPr/>
-              <a:t>Why were changes needed?</a:t>
+              <a:t>Intuitive</a:t>
+            </a:r>
+          </a:p>
+          <a:p>
+            <a:pPr lvl="1"/>
+            <a:r>
+              <a:rPr/>
+              <a:t>Capable of conveying intent even without being compiled into HTML or PDF</a:t>
+            </a:r>
+          </a:p>
+          <a:p>
+            <a:pPr lvl="0"/>
+            <a:r>
+              <a:rPr/>
+              <a:t>There are many Markdown interpreters. The Rstudio folks have been using </a:t>
+            </a:r>
+            <a:r>
+              <a:rPr>
+                <a:hlinkClick r:id="rId3"/>
+              </a:rPr>
+              <a:t>pandoc</a:t>
+            </a:r>
+            <a:r>
+              <a:rPr/>
+              <a:t> to crunch Markdown into other formats. It provides many useful extensions.</a:t>
+            </a:r>
+          </a:p>
+          <a:p>
+            <a:pPr lvl="0"/>
+            <a:r>
+              <a:rPr/>
+              <a:t>Customizations of style are mostly separate from the </a:t>
+            </a:r>
+            <a:r>
+              <a:rPr b="1"/>
+              <a:t>content</a:t>
+            </a:r>
+            <a:r>
+              <a:rPr/>
+              <a:t>.</a:t>
+            </a:r>
+          </a:p>
+          <a:p>
+            <a:pPr lvl="0"/>
+            <a:r>
+              <a:rPr>
+                <a:hlinkClick r:id="rId4"/>
+              </a:rPr>
+              <a:t>This presentation was made in Rmarkdown!</a:t>
+            </a:r>
+          </a:p>
+          <a:p>
+            <a:pPr lvl="0" indent="0" marL="0">
+              <a:spcBef>
+                <a:spcPts val="3000"/>
+              </a:spcBef>
+              <a:buNone/>
+            </a:pPr>
+            <a:r>
+              <a:rPr b="1"/>
+              <a:t>To Do</a:t>
+            </a:r>
+          </a:p>
+          <a:p>
+            <a:pPr lvl="0" indent="0" marL="0">
+              <a:buNone/>
+            </a:pPr>
+            <a:r>
+              <a:rPr/>
+              <a:t>Add Merge Conflicts Add Revert Add Rebase Add “github pages” * Open the shell (Tools-&gt;Shell…) and issue these two commands, replacing the name “John Doe” with yours, and his email with yours. + Use the email address that you gave to GitHub.</a:t>
+            </a:r>
+          </a:p>
+          <a:p>
+            <a:pPr lvl="0" indent="0">
+              <a:buNone/>
+            </a:pPr>
+            <a:r>
+              <a:rPr>
+                <a:solidFill>
+                  <a:srgbClr val="06287E"/>
+                </a:solidFill>
+                <a:latin typeface="Courier"/>
+              </a:rPr>
+              <a:t>git</a:t>
+            </a:r>
+            <a:r>
+              <a:rPr>
+                <a:latin typeface="Courier"/>
+              </a:rPr>
+              <a:t> config </a:t>
+            </a:r>
+            <a:r>
+              <a:rPr>
+                <a:solidFill>
+                  <a:srgbClr val="7D9029"/>
+                </a:solidFill>
+                <a:latin typeface="Courier"/>
+              </a:rPr>
+              <a:t>--global</a:t>
+            </a:r>
+            <a:r>
+              <a:rPr>
+                <a:latin typeface="Courier"/>
+              </a:rPr>
+              <a:t> user.name </a:t>
+            </a:r>
+            <a:r>
+              <a:rPr>
+                <a:solidFill>
+                  <a:srgbClr val="4070A0"/>
+                </a:solidFill>
+                <a:latin typeface="Courier"/>
+              </a:rPr>
+              <a:t>"John Doe"</a:t>
+            </a:r>
+            <a:br/>
+            <a:r>
+              <a:rPr>
+                <a:solidFill>
+                  <a:srgbClr val="06287E"/>
+                </a:solidFill>
+                <a:latin typeface="Courier"/>
+              </a:rPr>
+              <a:t>git</a:t>
+            </a:r>
+            <a:r>
+              <a:rPr>
+                <a:latin typeface="Courier"/>
+              </a:rPr>
+              <a:t> config </a:t>
+            </a:r>
+            <a:r>
+              <a:rPr>
+                <a:solidFill>
+                  <a:srgbClr val="7D9029"/>
+                </a:solidFill>
+                <a:latin typeface="Courier"/>
+              </a:rPr>
+              <a:t>--global</a:t>
+            </a:r>
+            <a:r>
+              <a:rPr>
+                <a:latin typeface="Courier"/>
+              </a:rPr>
+              <a:t> user.email johndoe@example.com</a:t>
             </a:r>
           </a:p>
         </p:txBody>
@@ -6941,30 +8419,48 @@
       </p:grpSpPr>
       <p:sp>
         <p:nvSpPr>
-          <p:cNvPr id="3" name="Content Placeholder 2"/>
-          <p:cNvSpPr>
-            <a:spLocks noGrp="1"/>
-          </p:cNvSpPr>
-          <p:nvPr>
-            <p:ph idx="1"/>
-          </p:nvPr>
-        </p:nvSpPr>
-        <p:spPr/>
+          <p:cNvPr id="2" name="Title 1"/>
+          <p:cNvSpPr>
+            <a:spLocks noGrp="1"/>
+          </p:cNvSpPr>
+          <p:nvPr>
+            <p:ph type="title"/>
+          </p:nvPr>
+        </p:nvSpPr>
+        <p:spPr>
+          <a:xfrm>
+            <a:off x="685800" y="2074333"/>
+            <a:ext cx="3680885" cy="1371600"/>
+          </a:xfrm>
+        </p:spPr>
         <p:txBody>
           <a:bodyPr/>
           <a:lstStyle/>
           <a:p>
             <a:pPr lvl="0" indent="0" marL="0">
-              <a:spcBef>
-                <a:spcPts val="3000"/>
-              </a:spcBef>
               <a:buNone/>
             </a:pPr>
             <a:r>
-              <a:rPr b="1"/>
+              <a:rPr/>
               <a:t>What is Reproducibility?</a:t>
             </a:r>
           </a:p>
+        </p:txBody>
+      </p:sp>
+      <p:sp>
+        <p:nvSpPr>
+          <p:cNvPr id="4" name="Text Placeholder 3"/>
+          <p:cNvSpPr>
+            <a:spLocks noGrp="1"/>
+          </p:cNvSpPr>
+          <p:nvPr>
+            <p:ph idx="2" sz="half" type="body"/>
+          </p:nvPr>
+        </p:nvSpPr>
+        <p:spPr/>
+        <p:txBody>
+          <a:bodyPr/>
+          <a:lstStyle/>
           <a:p>
             <a:pPr lvl="0" indent="0" marL="0">
               <a:buNone/>
@@ -6989,50 +8485,64 @@
               <a:t>“The data and code used to make a finding are available and they are presented in such a way that it is (relatively) straightforward for an independent researcher to recreate the finding.”</a:t>
             </a:r>
           </a:p>
-          <a:p>
-            <a:pPr lvl="0" indent="0" marL="0">
-              <a:spcBef>
-                <a:spcPts val="3000"/>
-              </a:spcBef>
+        </p:txBody>
+      </p:sp>
+      <p:pic>
+        <p:nvPicPr>
+          <p:cNvPr descr="fig:  images/Gandrud_Figure21.png" id="0" name="Picture 1"/>
+          <p:cNvPicPr>
+            <a:picLocks noGrp="1" noChangeAspect="1"/>
+          </p:cNvPicPr>
+          <p:nvPr/>
+        </p:nvPicPr>
+        <p:blipFill>
+          <a:blip r:embed="rId3"/>
+          <a:stretch>
+            <a:fillRect/>
+          </a:stretch>
+        </p:blipFill>
+        <p:spPr bwMode="auto">
+          <a:xfrm>
+            <a:off x="4648200" y="812800"/>
+            <a:ext cx="6159500" cy="4267200"/>
+          </a:xfrm>
+          <a:prstGeom prst="rect">
+            <a:avLst/>
+          </a:prstGeom>
+          <a:noFill/>
+          <a:ln w="9525">
+            <a:noFill/>
+            <a:headEnd/>
+            <a:tailEnd/>
+          </a:ln>
+        </p:spPr>
+      </p:pic>
+      <p:sp>
+        <p:nvSpPr>
+          <p:cNvPr id="1" name="TextBox 3"/>
+          <p:cNvSpPr txBox="1"/>
+          <p:nvPr/>
+        </p:nvSpPr>
+        <p:spPr>
+          <a:xfrm>
+            <a:off x="4648200" y="5283200"/>
+            <a:ext cx="6159500" cy="508000"/>
+          </a:xfrm>
+          <a:prstGeom prst="rect">
+            <a:avLst/>
+          </a:prstGeom>
+          <a:noFill/>
+        </p:spPr>
+        <p:txBody>
+          <a:bodyPr/>
+          <a:lstStyle/>
+          <a:p>
+            <a:pPr lvl="0" indent="0" marL="0" algn="ctr">
               <a:buNone/>
             </a:pPr>
             <a:r>
-              <a:rPr b="1"/>
-              <a:t>This actually seldom happens.</a:t>
-            </a:r>
-          </a:p>
-          <a:p>
-            <a:pPr lvl="0" indent="0" marL="0">
-              <a:buNone/>
-            </a:pPr>
-            <a:r>
-              <a:rPr/>
-              <a:t>Consider two interesting articles by Tim Vines: * </a:t>
-            </a:r>
-            <a:r>
-              <a:rPr>
-                <a:hlinkClick r:id="rId3"/>
-              </a:rPr>
-              <a:t>The Availability of Research Data Declines Rapidly with Article Age</a:t>
-            </a:r>
-            <a:r>
-              <a:rPr/>
-              <a:t> + Contacted Authors of 516 datasets with morphological data for discriminant analysis published between 1991 and 2011 + Received only 101 datasets!</a:t>
-            </a:r>
-          </a:p>
-          <a:p>
-            <a:pPr lvl="0"/>
-            <a:r>
-              <a:rPr/>
-              <a:t>“</a:t>
-            </a:r>
-            <a:r>
-              <a:rPr i="1"/>
-              <a:t>of 516 articles published between 2 and 22 years ago…the odds of a data set being extant fell by 17% per year.</a:t>
-            </a:r>
-            <a:r>
-              <a:rPr/>
-              <a:t>”</a:t>
+              <a:rPr/>
+              <a:t>GandrudFigure2.1</a:t>
             </a:r>
           </a:p>
         </p:txBody>
@@ -7042,7 +8552,7 @@
 </p:sld>
 </file>
 
-<file path=ppt/slides/slide20.xml><?xml version="1.0" encoding="utf-8"?>
+<file path=ppt/slides/slide3.xml><?xml version="1.0" encoding="utf-8"?>
 <p:sld xmlns:a="http://schemas.openxmlformats.org/drawingml/2006/main" xmlns:r="http://schemas.openxmlformats.org/officeDocument/2006/relationships" xmlns:p="http://schemas.openxmlformats.org/presentationml/2006/main">
   <p:cSld>
     <p:spTree>
@@ -7082,59 +8592,41 @@
             </a:pPr>
             <a:r>
               <a:rPr b="1"/>
-              <a:t>Github is a distributed version control system (DVCS)</a:t>
-            </a:r>
-          </a:p>
-          <a:p>
-            <a:pPr lvl="0"/>
-            <a:r>
-              <a:rPr/>
-              <a:t>DVCSs allow full access to every file, branch, and iteration of a project, and allows every user access to a full and self-contained history of all changes.</a:t>
-            </a:r>
-          </a:p>
-          <a:p>
-            <a:pPr lvl="0"/>
-            <a:r>
-              <a:rPr/>
-              <a:t>Unlike once popular centralized version control systems, DVCSs like Git don’t need a constant connection to a central repository. Developers can work anywhere and collaborate asynchronously from any time zone.</a:t>
+              <a:t>This actually seldom happens.</a:t>
             </a:r>
           </a:p>
           <a:p>
             <a:pPr lvl="0" indent="0" marL="0">
-              <a:spcBef>
-                <a:spcPts val="3000"/>
-              </a:spcBef>
               <a:buNone/>
             </a:pPr>
             <a:r>
-              <a:rPr b="1"/>
-              <a:t>Github DVCS</a:t>
-            </a:r>
-          </a:p>
-          <a:p>
-            <a:pPr lvl="0" indent="0" marL="0">
-              <a:spcBef>
-                <a:spcPts val="3000"/>
-              </a:spcBef>
-              <a:buNone/>
-            </a:pPr>
-            <a:r>
-              <a:rPr b="1"/>
-              <a:t>Github is a distributed version control system (DVCS)</a:t>
-            </a:r>
-          </a:p>
-          <a:p>
-            <a:pPr lvl="0"/>
-            <a:r>
-              <a:rPr/>
-              <a:t>Without version control, team members are subject to redundant tasks, slower timelines, and multiple copies of a single project.</a:t>
-            </a:r>
-          </a:p>
-          <a:p>
-            <a:pPr lvl="0"/>
-            <a:r>
-              <a:rPr/>
-              <a:t>To eliminate unnecessary work, Git and other VCSs give each contributor a unified and consistent view of a project, surfacing work that’s already in progress. Seeing a transparent history of changes, who made them, and how they contribute to the development of a project helps team members stay aligned while working independently.</a:t>
+              <a:rPr/>
+              <a:t>Consider two interesting articles by Tim Vines: * </a:t>
+            </a:r>
+            <a:r>
+              <a:rPr>
+                <a:hlinkClick r:id="rId2"/>
+              </a:rPr>
+              <a:t>The Availability of Research Data Declines Rapidly with Article Age</a:t>
+            </a:r>
+            <a:r>
+              <a:rPr/>
+              <a:t> + Contacted Authors of 516 datasets with morphological data for discriminant analysis published between 1991 and 2011 + Received only 101 datasets!</a:t>
+            </a:r>
+          </a:p>
+          <a:p>
+            <a:pPr lvl="0"/>
+            <a:r>
+              <a:rPr/>
+              <a:t>“</a:t>
+            </a:r>
+            <a:r>
+              <a:rPr i="1"/>
+              <a:t>of 516 articles published between 2 and 22 years ago…the odds of a data set being extant fell by 17% per year.</a:t>
+            </a:r>
+            <a:r>
+              <a:rPr/>
+              <a:t>”</a:t>
             </a:r>
           </a:p>
         </p:txBody>
@@ -7144,597 +8636,7 @@
 </p:sld>
 </file>
 
-<file path=ppt/slides/slide21.xml><?xml version="1.0" encoding="utf-8"?>
-<p:sld xmlns:a="http://schemas.openxmlformats.org/drawingml/2006/main" xmlns:r="http://schemas.openxmlformats.org/officeDocument/2006/relationships" xmlns:p="http://schemas.openxmlformats.org/presentationml/2006/main">
-  <p:cSld>
-    <p:spTree>
-      <p:nvGrpSpPr>
-        <p:cNvPr id="1" name=""/>
-        <p:cNvGrpSpPr/>
-        <p:nvPr/>
-      </p:nvGrpSpPr>
-      <p:grpSpPr>
-        <a:xfrm>
-          <a:off x="0" y="0"/>
-          <a:ext cx="0" cy="0"/>
-          <a:chOff x="0" y="0"/>
-          <a:chExt cx="0" cy="0"/>
-        </a:xfrm>
-      </p:grpSpPr>
-      <p:sp>
-        <p:nvSpPr>
-          <p:cNvPr id="3" name="Content Placeholder 2"/>
-          <p:cNvSpPr>
-            <a:spLocks noGrp="1"/>
-          </p:cNvSpPr>
-          <p:nvPr>
-            <p:ph idx="1"/>
-          </p:nvPr>
-        </p:nvSpPr>
-        <p:spPr/>
-        <p:txBody>
-          <a:bodyPr/>
-          <a:lstStyle/>
-          <a:p>
-            <a:pPr lvl="0" indent="0" marL="0">
-              <a:spcBef>
-                <a:spcPts val="3000"/>
-              </a:spcBef>
-              <a:buNone/>
-            </a:pPr>
-            <a:r>
-              <a:rPr b="1"/>
-              <a:t>What’s a repository?</a:t>
-            </a:r>
-          </a:p>
-          <a:p>
-            <a:pPr lvl="0"/>
-            <a:r>
-              <a:rPr/>
-              <a:t>A </a:t>
-            </a:r>
-            <a:r>
-              <a:rPr i="1"/>
-              <a:t>repository</a:t>
-            </a:r>
-            <a:r>
-              <a:rPr/>
-              <a:t>, or </a:t>
-            </a:r>
-            <a:r>
-              <a:rPr>
-                <a:hlinkClick r:id="rId2"/>
-              </a:rPr>
-              <a:t>Git</a:t>
-            </a:r>
-            <a:r>
-              <a:rPr/>
-              <a:t> project, encompasses the entire collection of files and folders associated with a project, along with each file’s revision history.</a:t>
-            </a:r>
-          </a:p>
-          <a:p>
-            <a:pPr lvl="0"/>
-            <a:r>
-              <a:rPr/>
-              <a:t>The file history appears as snapshots in time called </a:t>
-            </a:r>
-            <a:r>
-              <a:rPr i="1"/>
-              <a:t>commits</a:t>
-            </a:r>
-            <a:r>
-              <a:rPr/>
-              <a:t>, and can be organized into multiple lines of development called branches.</a:t>
-            </a:r>
-          </a:p>
-          <a:p>
-            <a:pPr lvl="0"/>
-            <a:r>
-              <a:rPr/>
-              <a:t>Because Git is a DVCS, repositories are self-contained units and anyone who owns a copy of the repository can access the entire codebase and its history.</a:t>
-            </a:r>
-          </a:p>
-          <a:p>
-            <a:pPr lvl="0"/>
-            <a:r>
-              <a:rPr/>
-              <a:t>Using the command line or other ease-of-use interfaces, a git repository also allows for: interaction with the history, cloning, creating branches, committing, merging, comparing changes across versions of code, and more.</a:t>
-            </a:r>
-          </a:p>
-        </p:txBody>
-      </p:sp>
-    </p:spTree>
-  </p:cSld>
-</p:sld>
-</file>
-
-<file path=ppt/slides/slide22.xml><?xml version="1.0" encoding="utf-8"?>
-<p:sld xmlns:a="http://schemas.openxmlformats.org/drawingml/2006/main" xmlns:r="http://schemas.openxmlformats.org/officeDocument/2006/relationships" xmlns:p="http://schemas.openxmlformats.org/presentationml/2006/main">
-  <p:cSld>
-    <p:spTree>
-      <p:nvGrpSpPr>
-        <p:cNvPr id="1" name=""/>
-        <p:cNvGrpSpPr/>
-        <p:nvPr/>
-      </p:nvGrpSpPr>
-      <p:grpSpPr>
-        <a:xfrm>
-          <a:off x="0" y="0"/>
-          <a:ext cx="0" cy="0"/>
-          <a:chOff x="0" y="0"/>
-          <a:chExt cx="0" cy="0"/>
-        </a:xfrm>
-      </p:grpSpPr>
-      <p:sp>
-        <p:nvSpPr>
-          <p:cNvPr id="3" name="Content Placeholder 2"/>
-          <p:cNvSpPr>
-            <a:spLocks noGrp="1"/>
-          </p:cNvSpPr>
-          <p:nvPr>
-            <p:ph idx="1"/>
-          </p:nvPr>
-        </p:nvSpPr>
-        <p:spPr/>
-        <p:txBody>
-          <a:bodyPr/>
-          <a:lstStyle/>
-          <a:p>
-            <a:pPr lvl="0" indent="0" marL="0">
-              <a:spcBef>
-                <a:spcPts val="3000"/>
-              </a:spcBef>
-              <a:buNone/>
-            </a:pPr>
-            <a:r>
-              <a:rPr b="1"/>
-              <a:t>What’s a repository?</a:t>
-            </a:r>
-          </a:p>
-          <a:p>
-            <a:pPr lvl="0"/>
-            <a:r>
-              <a:rPr/>
-              <a:t>Working in repositories keeps development projects organized and protected. Developers are encouraged to fix bugs, or create fresh features, without fear of derailing mainline development efforts.</a:t>
-            </a:r>
-          </a:p>
-          <a:p>
-            <a:pPr lvl="0"/>
-            <a:r>
-              <a:rPr/>
-              <a:t>Through platforms like GitHub, Git also provides more opportunities for project transparency and collaboration. Public repositories help teams work together to build the best possible final product.</a:t>
-            </a:r>
-          </a:p>
-        </p:txBody>
-      </p:sp>
-    </p:spTree>
-  </p:cSld>
-</p:sld>
-</file>
-
-<file path=ppt/slides/slide23.xml><?xml version="1.0" encoding="utf-8"?>
-<p:sld xmlns:a="http://schemas.openxmlformats.org/drawingml/2006/main" xmlns:r="http://schemas.openxmlformats.org/officeDocument/2006/relationships" xmlns:p="http://schemas.openxmlformats.org/presentationml/2006/main">
-  <p:cSld>
-    <p:spTree>
-      <p:nvGrpSpPr>
-        <p:cNvPr id="1" name=""/>
-        <p:cNvGrpSpPr/>
-        <p:nvPr/>
-      </p:nvGrpSpPr>
-      <p:grpSpPr>
-        <a:xfrm>
-          <a:off x="0" y="0"/>
-          <a:ext cx="0" cy="0"/>
-          <a:chOff x="0" y="0"/>
-          <a:chExt cx="0" cy="0"/>
-        </a:xfrm>
-      </p:grpSpPr>
-      <p:sp>
-        <p:nvSpPr>
-          <p:cNvPr id="3" name="Content Placeholder 2"/>
-          <p:cNvSpPr>
-            <a:spLocks noGrp="1"/>
-          </p:cNvSpPr>
-          <p:nvPr>
-            <p:ph idx="1"/>
-          </p:nvPr>
-        </p:nvSpPr>
-        <p:spPr/>
-        <p:txBody>
-          <a:bodyPr/>
-          <a:lstStyle/>
-          <a:p>
-            <a:pPr lvl="0" indent="0" marL="0">
-              <a:spcBef>
-                <a:spcPts val="3000"/>
-              </a:spcBef>
-              <a:buNone/>
-            </a:pPr>
-            <a:r>
-              <a:rPr b="1"/>
-              <a:t>The Github Flow</a:t>
-            </a:r>
-          </a:p>
-          <a:p>
-            <a:pPr lvl="0" indent="0" marL="0">
-              <a:buNone/>
-            </a:pPr>
-            <a:r>
-              <a:rPr>
-                <a:hlinkClick r:id="rId2"/>
-              </a:rPr>
-              <a:t>Video</a:t>
-            </a:r>
-          </a:p>
-          <a:p>
-            <a:pPr lvl="0" indent="0" marL="0">
-              <a:spcBef>
-                <a:spcPts val="3000"/>
-              </a:spcBef>
-              <a:buNone/>
-            </a:pPr>
-            <a:r>
-              <a:rPr b="1"/>
-              <a:t>The Github Flow</a:t>
-            </a:r>
-          </a:p>
-          <a:p>
-            <a:pPr lvl="0" indent="0" marL="0">
-              <a:spcBef>
-                <a:spcPts val="3000"/>
-              </a:spcBef>
-              <a:buNone/>
-            </a:pPr>
-            <a:r>
-              <a:rPr b="1"/>
-              <a:t>The Github Flow</a:t>
-            </a:r>
-          </a:p>
-          <a:p>
-            <a:pPr lvl="0" indent="0" marL="0">
-              <a:buNone/>
-            </a:pPr>
-            <a:r>
-              <a:rPr/>
-              <a:t>The GitHub flow has six steps, each with distinct benefits when implemented:</a:t>
-            </a:r>
-          </a:p>
-          <a:p>
-            <a:pPr lvl="0"/>
-            <a:r>
-              <a:rPr/>
-              <a:t>Create a branch:Topic branches created from the canonical deployment branch (usually master) allow teams to contribute to many parallel efforts. Short-lived topic branches, in particular, keep teams focused and results in quick ships.</a:t>
-            </a:r>
-          </a:p>
-          <a:p>
-            <a:pPr lvl="0"/>
-            <a:r>
-              <a:rPr/>
-              <a:t>Add commits:Snapshots of development efforts within a branch create safe, revertible points in the project’s history.</a:t>
-            </a:r>
-          </a:p>
-          <a:p>
-            <a:pPr lvl="0"/>
-            <a:r>
-              <a:rPr/>
-              <a:t>Open a pull request:Pull requests publicize a project’s ongoing efforts and set the tone for a transparent development process.</a:t>
-            </a:r>
-          </a:p>
-          <a:p>
-            <a:pPr lvl="0"/>
-            <a:r>
-              <a:rPr/>
-              <a:t>Discuss and review code:Teams participate in code reviews by commenting, testing, and reviewing open pull requests. Code review is at the core of an open and participatory culture.</a:t>
-            </a:r>
-          </a:p>
-          <a:p>
-            <a:pPr lvl="0"/>
-            <a:r>
-              <a:rPr/>
-              <a:t>Merge:Upon clicking merge, GitHub automatically performs the equivalent of a local ‘git merge’ operation. GitHub also keeps the entire branch development history on the merged pull request.</a:t>
-            </a:r>
-          </a:p>
-          <a:p>
-            <a:pPr lvl="0"/>
-            <a:r>
-              <a:rPr/>
-              <a:t>Deploy:Teams can choose the best release cycles or incorporate continuous integration tools and operate with the assurance that code on the deployment branch has gone through a robust workflow.</a:t>
-            </a:r>
-          </a:p>
-        </p:txBody>
-      </p:sp>
-    </p:spTree>
-  </p:cSld>
-</p:sld>
-</file>
-
-<file path=ppt/slides/slide24.xml><?xml version="1.0" encoding="utf-8"?>
-<p:sld xmlns:a="http://schemas.openxmlformats.org/drawingml/2006/main" xmlns:r="http://schemas.openxmlformats.org/officeDocument/2006/relationships" xmlns:p="http://schemas.openxmlformats.org/presentationml/2006/main">
-  <p:cSld>
-    <p:spTree>
-      <p:nvGrpSpPr>
-        <p:cNvPr id="1" name=""/>
-        <p:cNvGrpSpPr/>
-        <p:nvPr/>
-      </p:nvGrpSpPr>
-      <p:grpSpPr>
-        <a:xfrm>
-          <a:off x="0" y="0"/>
-          <a:ext cx="0" cy="0"/>
-          <a:chOff x="0" y="0"/>
-          <a:chExt cx="0" cy="0"/>
-        </a:xfrm>
-      </p:grpSpPr>
-      <p:sp>
-        <p:nvSpPr>
-          <p:cNvPr id="3" name="Content Placeholder 2"/>
-          <p:cNvSpPr>
-            <a:spLocks noGrp="1"/>
-          </p:cNvSpPr>
-          <p:nvPr>
-            <p:ph idx="1"/>
-          </p:nvPr>
-        </p:nvSpPr>
-        <p:spPr/>
-        <p:txBody>
-          <a:bodyPr/>
-          <a:lstStyle/>
-          <a:p>
-            <a:pPr lvl="0" indent="0" marL="0">
-              <a:spcBef>
-                <a:spcPts val="3000"/>
-              </a:spcBef>
-              <a:buNone/>
-            </a:pPr>
-            <a:r>
-              <a:rPr b="1"/>
-              <a:t>Alternatives to Github exist!</a:t>
-            </a:r>
-          </a:p>
-          <a:p>
-            <a:pPr lvl="0"/>
-            <a:r>
-              <a:rPr/>
-              <a:t>Bitbucket</a:t>
-            </a:r>
-          </a:p>
-          <a:p>
-            <a:pPr lvl="0"/>
-            <a:r>
-              <a:rPr/>
-              <a:t>Gitlab</a:t>
-            </a:r>
-          </a:p>
-          <a:p>
-            <a:pPr lvl="0"/>
-            <a:r>
-              <a:rPr/>
-              <a:t>Gitbucket</a:t>
-            </a:r>
-          </a:p>
-          <a:p>
-            <a:pPr lvl="0" indent="0" marL="0">
-              <a:spcBef>
-                <a:spcPts val="3000"/>
-              </a:spcBef>
-              <a:buNone/>
-            </a:pPr>
-            <a:r>
-              <a:rPr b="1"/>
-              <a:t>Let’s make a new project from a Github repository</a:t>
-            </a:r>
-          </a:p>
-          <a:p>
-            <a:pPr lvl="0" indent="0" marL="0">
-              <a:buNone/>
-            </a:pPr>
-            <a:r>
-              <a:rPr/>
-              <a:t>Do This in RStudio:</a:t>
-            </a:r>
-          </a:p>
-          <a:p>
-            <a:pPr lvl="0" indent="-457200" marL="457200">
-              <a:buAutoNum type="arabicPeriod"/>
-            </a:pPr>
-            <a:r>
-              <a:rPr/>
-              <a:t>Select File -&gt; New Project</a:t>
-            </a:r>
-          </a:p>
-          <a:p>
-            <a:pPr lvl="0" indent="-457200" marL="457200">
-              <a:buAutoNum type="arabicPeriod"/>
-            </a:pPr>
-            <a:r>
-              <a:rPr/>
-              <a:t>Create project from: Choose “Version Control”</a:t>
-            </a:r>
-          </a:p>
-          <a:p>
-            <a:pPr lvl="1" indent="-457200" marL="914400">
-              <a:buAutoNum type="arabicPeriod"/>
-            </a:pPr>
-            <a:r>
-              <a:rPr/>
-              <a:t>Choose “Git”</a:t>
-            </a:r>
-          </a:p>
-          <a:p>
-            <a:pPr lvl="1" indent="-457200" marL="914400">
-              <a:buAutoNum type="arabicPeriod"/>
-            </a:pPr>
-            <a:r>
-              <a:rPr/>
-              <a:t>Input the url of this repository 1.https://github.com/ericcrandall/reproducible_research</a:t>
-            </a:r>
-          </a:p>
-          <a:p>
-            <a:pPr lvl="1" indent="-457200" marL="914400">
-              <a:buAutoNum type="arabicPeriod"/>
-            </a:pPr>
-            <a:r>
-              <a:rPr/>
-              <a:t>and put it somewhere in your home directory (browse to where you want to put it in the “create project as subdirectory of:”)</a:t>
-            </a:r>
-          </a:p>
-          <a:p>
-            <a:pPr lvl="1" indent="-457200" marL="914400">
-              <a:buAutoNum type="arabicPeriod"/>
-            </a:pPr>
-            <a:r>
-              <a:rPr/>
-              <a:t>Hit </a:t>
-            </a:r>
-            <a:r>
-              <a:rPr>
-                <a:latin typeface="Courier"/>
-              </a:rPr>
-              <a:t>Create Project</a:t>
-            </a:r>
-          </a:p>
-        </p:txBody>
-      </p:sp>
-    </p:spTree>
-  </p:cSld>
-</p:sld>
-</file>
-
-<file path=ppt/slides/slide25.xml><?xml version="1.0" encoding="utf-8"?>
-<p:sld xmlns:a="http://schemas.openxmlformats.org/drawingml/2006/main" xmlns:r="http://schemas.openxmlformats.org/officeDocument/2006/relationships" xmlns:p="http://schemas.openxmlformats.org/presentationml/2006/main">
-  <p:cSld>
-    <p:spTree>
-      <p:nvGrpSpPr>
-        <p:cNvPr id="1" name=""/>
-        <p:cNvGrpSpPr/>
-        <p:nvPr/>
-      </p:nvGrpSpPr>
-      <p:grpSpPr>
-        <a:xfrm>
-          <a:off x="0" y="0"/>
-          <a:ext cx="0" cy="0"/>
-          <a:chOff x="0" y="0"/>
-          <a:chExt cx="0" cy="0"/>
-        </a:xfrm>
-      </p:grpSpPr>
-      <p:sp>
-        <p:nvSpPr>
-          <p:cNvPr id="3" name="Content Placeholder 2"/>
-          <p:cNvSpPr>
-            <a:spLocks noGrp="1"/>
-          </p:cNvSpPr>
-          <p:nvPr>
-            <p:ph idx="1"/>
-          </p:nvPr>
-        </p:nvSpPr>
-        <p:spPr/>
-        <p:txBody>
-          <a:bodyPr/>
-          <a:lstStyle/>
-          <a:p>
-            <a:pPr lvl="0" indent="0" marL="0">
-              <a:spcBef>
-                <a:spcPts val="3000"/>
-              </a:spcBef>
-              <a:buNone/>
-            </a:pPr>
-            <a:r>
-              <a:rPr b="1"/>
-              <a:t>Intro to Rmarkdown</a:t>
-            </a:r>
-          </a:p>
-          <a:p>
-            <a:pPr lvl="0"/>
-            <a:r>
-              <a:rPr/>
-              <a:t>Designed as a text </a:t>
-            </a:r>
-            <a:r>
-              <a:rPr i="1"/>
-              <a:t>markup</a:t>
-            </a:r>
-            <a:r>
-              <a:rPr/>
-              <a:t> language that would be</a:t>
-            </a:r>
-          </a:p>
-          <a:p>
-            <a:pPr lvl="1"/>
-            <a:r>
-              <a:rPr/>
-              <a:t>Simple</a:t>
-            </a:r>
-          </a:p>
-          <a:p>
-            <a:pPr lvl="1"/>
-            <a:r>
-              <a:rPr/>
-              <a:t>Expressive</a:t>
-            </a:r>
-          </a:p>
-          <a:p>
-            <a:pPr lvl="1"/>
-            <a:r>
-              <a:rPr/>
-              <a:t>Intuitive</a:t>
-            </a:r>
-          </a:p>
-          <a:p>
-            <a:pPr lvl="1"/>
-            <a:r>
-              <a:rPr/>
-              <a:t>Capable of conveying intent even without being compiled into HTML or PDF</a:t>
-            </a:r>
-          </a:p>
-          <a:p>
-            <a:pPr lvl="0"/>
-            <a:r>
-              <a:rPr/>
-              <a:t>There are many Markdown interpreters. The Rstudio folks have been using </a:t>
-            </a:r>
-            <a:r>
-              <a:rPr>
-                <a:hlinkClick r:id="rId2"/>
-              </a:rPr>
-              <a:t>pandoc</a:t>
-            </a:r>
-            <a:r>
-              <a:rPr/>
-              <a:t> to crunch Markdown into other formats. It provides many useful extensions.</a:t>
-            </a:r>
-          </a:p>
-          <a:p>
-            <a:pPr lvl="0"/>
-            <a:r>
-              <a:rPr/>
-              <a:t>Customizations of style are mostly separate from the </a:t>
-            </a:r>
-            <a:r>
-              <a:rPr b="1"/>
-              <a:t>content</a:t>
-            </a:r>
-            <a:r>
-              <a:rPr/>
-              <a:t>.</a:t>
-            </a:r>
-          </a:p>
-          <a:p>
-            <a:pPr lvl="0"/>
-            <a:r>
-              <a:rPr>
-                <a:hlinkClick r:id="rId3"/>
-              </a:rPr>
-              <a:t>This presentation was made in Rmarkdown!</a:t>
-            </a:r>
-          </a:p>
-        </p:txBody>
-      </p:sp>
-    </p:spTree>
-  </p:cSld>
-</p:sld>
-</file>
-
-<file path=ppt/slides/slide3.xml><?xml version="1.0" encoding="utf-8"?>
+<file path=ppt/slides/slide4.xml><?xml version="1.0" encoding="utf-8"?>
 <p:sld xmlns:a="http://schemas.openxmlformats.org/drawingml/2006/main" xmlns:r="http://schemas.openxmlformats.org/officeDocument/2006/relationships" xmlns:p="http://schemas.openxmlformats.org/presentationml/2006/main">
   <p:cSld>
     <p:spTree>
@@ -7816,98 +8718,6 @@
 </p:sld>
 </file>
 
-<file path=ppt/slides/slide4.xml><?xml version="1.0" encoding="utf-8"?>
-<p:sld xmlns:a="http://schemas.openxmlformats.org/drawingml/2006/main" xmlns:r="http://schemas.openxmlformats.org/officeDocument/2006/relationships" xmlns:p="http://schemas.openxmlformats.org/presentationml/2006/main">
-  <p:cSld>
-    <p:spTree>
-      <p:nvGrpSpPr>
-        <p:cNvPr id="1" name=""/>
-        <p:cNvGrpSpPr/>
-        <p:nvPr/>
-      </p:nvGrpSpPr>
-      <p:grpSpPr>
-        <a:xfrm>
-          <a:off x="0" y="0"/>
-          <a:ext cx="0" cy="0"/>
-          <a:chOff x="0" y="0"/>
-          <a:chExt cx="0" cy="0"/>
-        </a:xfrm>
-      </p:grpSpPr>
-      <p:sp>
-        <p:nvSpPr>
-          <p:cNvPr id="3" name="Content Placeholder 2"/>
-          <p:cNvSpPr>
-            <a:spLocks noGrp="1"/>
-          </p:cNvSpPr>
-          <p:nvPr>
-            <p:ph idx="1"/>
-          </p:nvPr>
-        </p:nvSpPr>
-        <p:spPr/>
-        <p:txBody>
-          <a:bodyPr/>
-          <a:lstStyle/>
-          <a:p>
-            <a:pPr lvl="0" indent="0" marL="0">
-              <a:spcBef>
-                <a:spcPts val="3000"/>
-              </a:spcBef>
-              <a:buNone/>
-            </a:pPr>
-            <a:r>
-              <a:rPr b="1"/>
-              <a:t>Data not only need to be easily available, but methods also need to be reproducible</a:t>
-            </a:r>
-          </a:p>
-          <a:p>
-            <a:pPr lvl="0"/>
-            <a:r>
-              <a:rPr/>
-              <a:t>Gilbert et al. 2012 - </a:t>
-            </a:r>
-            <a:r>
-              <a:rPr>
-                <a:hlinkClick r:id="rId2"/>
-              </a:rPr>
-              <a:t>Recommendations for utilizing and reporting population genetic analyses: the reproducibility of genetic clustering using the program structure</a:t>
-            </a:r>
-          </a:p>
-          <a:p>
-            <a:pPr lvl="1"/>
-            <a:r>
-              <a:rPr/>
-              <a:t>“</a:t>
-            </a:r>
-            <a:r>
-              <a:rPr i="1"/>
-              <a:t>we reanalysed data sets gathered from papers using the software package ‘structure’… 30% of analyses were unable to reproduce the same number of population clusters.</a:t>
-            </a:r>
-            <a:r>
-              <a:rPr/>
-              <a:t>”</a:t>
-            </a:r>
-          </a:p>
-          <a:p>
-            <a:pPr lvl="0"/>
-            <a:r>
-              <a:rPr/>
-              <a:t>Scientific articles have fairly detailed methods sections, but those are typically insufficient to actually reproduce an analysis.</a:t>
-            </a:r>
-          </a:p>
-          <a:p>
-            <a:pPr lvl="0"/>
-            <a:r>
-              <a:rPr/>
-              <a:t>Scientists owe it to themselves and their community to have an explicit record of all the steps in an analysis done at a computer.</a:t>
-            </a:r>
-          </a:p>
-        </p:txBody>
-      </p:sp>
-    </p:spTree>
-  </p:cSld>
-</p:sld>
-</file>
-
 <file path=ppt/slides/slide5.xml><?xml version="1.0" encoding="utf-8"?>
 <p:sld xmlns:a="http://schemas.openxmlformats.org/drawingml/2006/main" xmlns:r="http://schemas.openxmlformats.org/officeDocument/2006/relationships" xmlns:p="http://schemas.openxmlformats.org/presentationml/2006/main">
   <p:cSld>
@@ -7927,12 +8737,12 @@
       </p:grpSpPr>
       <p:sp>
         <p:nvSpPr>
-          <p:cNvPr id="4" name="Text Placeholder 3"/>
-          <p:cNvSpPr>
-            <a:spLocks noGrp="1"/>
-          </p:cNvSpPr>
-          <p:nvPr>
-            <p:ph idx="2" sz="half" type="body"/>
+          <p:cNvPr id="3" name="Content Placeholder 2"/>
+          <p:cNvSpPr>
+            <a:spLocks noGrp="1"/>
+          </p:cNvSpPr>
+          <p:nvPr>
+            <p:ph idx="1"/>
           </p:nvPr>
         </p:nvSpPr>
         <p:spPr/>
@@ -7948,7 +8758,129 @@
             </a:pPr>
             <a:r>
               <a:rPr b="1"/>
-              <a:t>Why are Open Data and Reproducibility Important For Science?</a:t>
+              <a:t>Data not only need to be easily available, but methods also need to be reproducible</a:t>
+            </a:r>
+          </a:p>
+          <a:p>
+            <a:pPr lvl="0"/>
+            <a:r>
+              <a:rPr/>
+              <a:t>Gilbert et al. 2012 - </a:t>
+            </a:r>
+            <a:r>
+              <a:rPr>
+                <a:hlinkClick r:id="rId2"/>
+              </a:rPr>
+              <a:t>Recommendations for utilizing and reporting population genetic analyses: the reproducibility of genetic clustering using the program structure</a:t>
+            </a:r>
+          </a:p>
+          <a:p>
+            <a:pPr lvl="1"/>
+            <a:r>
+              <a:rPr/>
+              <a:t>“</a:t>
+            </a:r>
+            <a:r>
+              <a:rPr i="1"/>
+              <a:t>we reanalysed data sets gathered from papers using the software package ‘structure’… 30% of analyses were unable to reproduce the same number of population clusters.</a:t>
+            </a:r>
+            <a:r>
+              <a:rPr/>
+              <a:t>”</a:t>
+            </a:r>
+          </a:p>
+          <a:p>
+            <a:pPr lvl="0"/>
+            <a:r>
+              <a:rPr/>
+              <a:t>Scientific articles have fairly detailed methods sections, but those are typically insufficient to actually reproduce an analysis.</a:t>
+            </a:r>
+          </a:p>
+          <a:p>
+            <a:pPr lvl="0"/>
+            <a:r>
+              <a:rPr/>
+              <a:t>Scientists owe it to themselves and their community to have an explicit record of all the steps in an analysis done at a computer.</a:t>
+            </a:r>
+          </a:p>
+        </p:txBody>
+      </p:sp>
+    </p:spTree>
+  </p:cSld>
+</p:sld>
+</file>
+
+<file path=ppt/slides/slide6.xml><?xml version="1.0" encoding="utf-8"?>
+<p:sld xmlns:a="http://schemas.openxmlformats.org/drawingml/2006/main" xmlns:r="http://schemas.openxmlformats.org/officeDocument/2006/relationships" xmlns:p="http://schemas.openxmlformats.org/presentationml/2006/main">
+  <p:cSld>
+    <p:spTree>
+      <p:nvGrpSpPr>
+        <p:cNvPr id="1" name=""/>
+        <p:cNvGrpSpPr/>
+        <p:nvPr/>
+      </p:nvGrpSpPr>
+      <p:grpSpPr>
+        <a:xfrm>
+          <a:off x="0" y="0"/>
+          <a:ext cx="0" cy="0"/>
+          <a:chOff x="0" y="0"/>
+          <a:chExt cx="0" cy="0"/>
+        </a:xfrm>
+      </p:grpSpPr>
+      <p:sp>
+        <p:nvSpPr>
+          <p:cNvPr id="2" name="Title 1"/>
+          <p:cNvSpPr>
+            <a:spLocks noGrp="1"/>
+          </p:cNvSpPr>
+          <p:nvPr>
+            <p:ph type="title"/>
+          </p:nvPr>
+        </p:nvSpPr>
+        <p:spPr>
+          <a:xfrm>
+            <a:off x="685800" y="2074333"/>
+            <a:ext cx="3680885" cy="1371600"/>
+          </a:xfrm>
+        </p:spPr>
+        <p:txBody>
+          <a:bodyPr/>
+          <a:lstStyle/>
+          <a:p>
+            <a:pPr lvl="0" indent="0" marL="0">
+              <a:buNone/>
+            </a:pPr>
+            <a:r>
+              <a:rPr/>
+              <a:t>Why are Open Data and Reproducibility Important?</a:t>
+            </a:r>
+          </a:p>
+        </p:txBody>
+      </p:sp>
+      <p:sp>
+        <p:nvSpPr>
+          <p:cNvPr id="4" name="Text Placeholder 3"/>
+          <p:cNvSpPr>
+            <a:spLocks noGrp="1"/>
+          </p:cNvSpPr>
+          <p:nvPr>
+            <p:ph idx="2" sz="half" type="body"/>
+          </p:nvPr>
+        </p:nvSpPr>
+        <p:spPr/>
+        <p:txBody>
+          <a:bodyPr/>
+          <a:lstStyle/>
+          <a:p>
+            <a:pPr lvl="0" indent="0" marL="0">
+              <a:spcBef>
+                <a:spcPts val="3000"/>
+              </a:spcBef>
+              <a:buNone/>
+            </a:pPr>
+            <a:r>
+              <a:rPr b="1"/>
+              <a:t>For Science?</a:t>
             </a:r>
           </a:p>
           <a:p>
@@ -8046,55 +8978,6 @@
 </p:sld>
 </file>
 
-<file path=ppt/slides/slide6.xml><?xml version="1.0" encoding="utf-8"?>
-<p:sld xmlns:a="http://schemas.openxmlformats.org/drawingml/2006/main" xmlns:r="http://schemas.openxmlformats.org/officeDocument/2006/relationships" xmlns:p="http://schemas.openxmlformats.org/presentationml/2006/main">
-  <p:cSld>
-    <p:spTree>
-      <p:nvGrpSpPr>
-        <p:cNvPr id="1" name=""/>
-        <p:cNvGrpSpPr/>
-        <p:nvPr/>
-      </p:nvGrpSpPr>
-      <p:grpSpPr>
-        <a:xfrm>
-          <a:off x="0" y="0"/>
-          <a:ext cx="0" cy="0"/>
-          <a:chOff x="0" y="0"/>
-          <a:chExt cx="0" cy="0"/>
-        </a:xfrm>
-      </p:grpSpPr>
-      <p:sp>
-        <p:nvSpPr>
-          <p:cNvPr id="3" name="Content Placeholder 2"/>
-          <p:cNvSpPr>
-            <a:spLocks noGrp="1"/>
-          </p:cNvSpPr>
-          <p:nvPr>
-            <p:ph idx="1"/>
-          </p:nvPr>
-        </p:nvSpPr>
-        <p:spPr/>
-        <p:txBody>
-          <a:bodyPr/>
-          <a:lstStyle/>
-          <a:p>
-            <a:pPr lvl="0" indent="0" marL="0">
-              <a:buNone/>
-            </a:pPr>
-            <a:r>
-              <a:rPr>
-                <a:hlinkClick r:id="rId2"/>
-              </a:rPr>
-              <a:t>Gandrud 2014</a:t>
-            </a:r>
-          </a:p>
-        </p:txBody>
-      </p:sp>
-    </p:spTree>
-  </p:cSld>
-</p:sld>
-</file>
-
 <file path=ppt/slides/slide7.xml><?xml version="1.0" encoding="utf-8"?>
 <p:sld xmlns:a="http://schemas.openxmlformats.org/drawingml/2006/main" xmlns:r="http://schemas.openxmlformats.org/officeDocument/2006/relationships" xmlns:p="http://schemas.openxmlformats.org/presentationml/2006/main">
   <p:cSld>
@@ -8114,18 +8997,29 @@
       </p:grpSpPr>
       <p:sp>
         <p:nvSpPr>
-          <p:cNvPr id="3" name="Content Placeholder 2"/>
-          <p:cNvSpPr>
-            <a:spLocks noGrp="1"/>
-          </p:cNvSpPr>
-          <p:nvPr>
-            <p:ph idx="1"/>
+          <p:cNvPr id="4" name="Text Placeholder 3"/>
+          <p:cNvSpPr>
+            <a:spLocks noGrp="1"/>
+          </p:cNvSpPr>
+          <p:nvPr>
+            <p:ph idx="2" sz="half" type="body"/>
           </p:nvPr>
         </p:nvSpPr>
         <p:spPr/>
         <p:txBody>
           <a:bodyPr/>
           <a:lstStyle/>
+          <a:p>
+            <a:pPr lvl="0" indent="0" marL="0">
+              <a:buNone/>
+            </a:pPr>
+            <a:r>
+              <a:rPr>
+                <a:hlinkClick r:id="rId2"/>
+              </a:rPr>
+              <a:t>Gandrud 2014</a:t>
+            </a:r>
+          </a:p>
           <a:p>
             <a:pPr lvl="0" indent="0" marL="0">
               <a:spcBef>
@@ -8135,50 +9029,7 @@
             </a:pPr>
             <a:r>
               <a:rPr b="1"/>
-              <a:t>Why are Open Data and Reproducibility Important for </a:t>
-            </a:r>
-            <a:r>
-              <a:rPr b="1" i="1"/>
-              <a:t>You</a:t>
-            </a:r>
-            <a:r>
-              <a:rPr b="1"/>
-              <a:t>?</a:t>
-            </a:r>
-          </a:p>
-          <a:p>
-            <a:pPr lvl="0"/>
-            <a:r>
-              <a:rPr/>
-              <a:t>Better work habits</a:t>
-            </a:r>
-          </a:p>
-          <a:p>
-            <a:pPr lvl="1"/>
-            <a:r>
-              <a:rPr/>
-              <a:t>better, clearer documentation</a:t>
-            </a:r>
-          </a:p>
-          <a:p>
-            <a:pPr lvl="0"/>
-            <a:r>
-              <a:rPr/>
-              <a:t>Better teamwork</a:t>
-            </a:r>
-          </a:p>
-          <a:p>
-            <a:pPr lvl="0"/>
-            <a:r>
-              <a:rPr/>
-              <a:t>Re-analysis is easier</a:t>
-            </a:r>
-          </a:p>
-          <a:p>
-            <a:pPr lvl="0"/>
-            <a:r>
-              <a:rPr/>
-              <a:t>Higher research impact</a:t>
+              <a:t>Open Science</a:t>
             </a:r>
           </a:p>
           <a:p>
@@ -8187,9 +9038,90 @@
             </a:pPr>
             <a:r>
               <a:rPr>
-                <a:hlinkClick r:id="rId2"/>
+                <a:hlinkClick r:id="rId3"/>
               </a:rPr>
-              <a:t>Gandrud 2014</a:t>
+              <a:t>Open Science Links</a:t>
+            </a:r>
+          </a:p>
+          <a:p>
+            <a:pPr lvl="0"/>
+            <a:r>
+              <a:rPr/>
+              <a:t>Open Data</a:t>
+            </a:r>
+          </a:p>
+          <a:p>
+            <a:pPr lvl="0"/>
+            <a:r>
+              <a:rPr/>
+              <a:t>Reproducible Methods</a:t>
+            </a:r>
+          </a:p>
+          <a:p>
+            <a:pPr lvl="0"/>
+            <a:r>
+              <a:rPr/>
+              <a:t>Open Access Publications</a:t>
+            </a:r>
+          </a:p>
+        </p:txBody>
+      </p:sp>
+      <p:pic>
+        <p:nvPicPr>
+          <p:cNvPr descr="fig:  images/bigdata_nielsen_nature.png" id="0" name="Picture 1"/>
+          <p:cNvPicPr>
+            <a:picLocks noGrp="1" noChangeAspect="1"/>
+          </p:cNvPicPr>
+          <p:nvPr/>
+        </p:nvPicPr>
+        <p:blipFill>
+          <a:blip r:embed="rId4"/>
+          <a:stretch>
+            <a:fillRect/>
+          </a:stretch>
+        </p:blipFill>
+        <p:spPr bwMode="auto">
+          <a:xfrm>
+            <a:off x="4648200" y="1651000"/>
+            <a:ext cx="6159500" cy="2603500"/>
+          </a:xfrm>
+          <a:prstGeom prst="rect">
+            <a:avLst/>
+          </a:prstGeom>
+          <a:noFill/>
+          <a:ln w="9525">
+            <a:noFill/>
+            <a:headEnd/>
+            <a:tailEnd/>
+          </a:ln>
+        </p:spPr>
+      </p:pic>
+      <p:sp>
+        <p:nvSpPr>
+          <p:cNvPr id="1" name="TextBox 3"/>
+          <p:cNvSpPr txBox="1"/>
+          <p:nvPr/>
+        </p:nvSpPr>
+        <p:spPr>
+          <a:xfrm>
+            <a:off x="4648200" y="5283200"/>
+            <a:ext cx="6159500" cy="508000"/>
+          </a:xfrm>
+          <a:prstGeom prst="rect">
+            <a:avLst/>
+          </a:prstGeom>
+          <a:noFill/>
+        </p:spPr>
+        <p:txBody>
+          <a:bodyPr/>
+          <a:lstStyle/>
+          <a:p>
+            <a:pPr lvl="0" indent="0" marL="0" algn="ctr">
+              <a:buNone/>
+            </a:pPr>
+            <a:r>
+              <a:rPr/>
+              <a:t>Big Data</a:t>
             </a:r>
           </a:p>
         </p:txBody>
@@ -8239,69 +9171,61 @@
             </a:pPr>
             <a:r>
               <a:rPr b="1"/>
-              <a:t>Tools for Research Reproducibility</a:t>
-            </a:r>
-          </a:p>
-          <a:p>
-            <a:pPr lvl="0"/>
-            <a:r>
-              <a:rPr/>
-              <a:t>Open Source Everything</a:t>
-            </a:r>
-          </a:p>
-          <a:p>
-            <a:pPr lvl="0"/>
-            <a:r>
-              <a:rPr/>
-              <a:t>R language</a:t>
-            </a:r>
-          </a:p>
-          <a:p>
-            <a:pPr lvl="0"/>
-            <a:r>
-              <a:rPr/>
-              <a:t>Rstudio and knitR</a:t>
-            </a:r>
-          </a:p>
-          <a:p>
-            <a:pPr lvl="0"/>
-            <a:r>
-              <a:rPr/>
-              <a:t>Markdown and LaTeX</a:t>
-            </a:r>
-          </a:p>
-          <a:p>
-            <a:pPr lvl="0"/>
-            <a:r>
-              <a:rPr/>
-              <a:t>Unix operating system</a:t>
-            </a:r>
-          </a:p>
-          <a:p>
-            <a:pPr lvl="0"/>
-            <a:r>
-              <a:rPr/>
-              <a:t>GitHub and git - version control (not covered in this class)</a:t>
-            </a:r>
-          </a:p>
-          <a:p>
-            <a:pPr lvl="0"/>
-            <a:r>
-              <a:rPr/>
-              <a:t>Creative Commons Licensing</a:t>
-            </a:r>
-          </a:p>
-          <a:p>
-            <a:pPr lvl="0"/>
+              <a:t>Why are Open Data and Reproducibility Important for </a:t>
+            </a:r>
+            <a:r>
+              <a:rPr b="1" i="1"/>
+              <a:t>You</a:t>
+            </a:r>
+            <a:r>
+              <a:rPr b="1"/>
+              <a:t>?</a:t>
+            </a:r>
+          </a:p>
+          <a:p>
+            <a:pPr lvl="0"/>
+            <a:r>
+              <a:rPr/>
+              <a:t>Better work habits</a:t>
+            </a:r>
+          </a:p>
+          <a:p>
+            <a:pPr lvl="1"/>
+            <a:r>
+              <a:rPr/>
+              <a:t>better, clearer documentation</a:t>
+            </a:r>
+          </a:p>
+          <a:p>
+            <a:pPr lvl="0"/>
+            <a:r>
+              <a:rPr/>
+              <a:t>Better teamwork</a:t>
+            </a:r>
+          </a:p>
+          <a:p>
+            <a:pPr lvl="0"/>
+            <a:r>
+              <a:rPr/>
+              <a:t>Re-analysis is easier</a:t>
+            </a:r>
+          </a:p>
+          <a:p>
+            <a:pPr lvl="0"/>
+            <a:r>
+              <a:rPr/>
+              <a:t>Higher research impact</a:t>
+            </a:r>
+          </a:p>
+          <a:p>
+            <a:pPr lvl="0" indent="0" marL="0">
+              <a:buNone/>
+            </a:pPr>
             <a:r>
               <a:rPr>
                 <a:hlinkClick r:id="rId2"/>
               </a:rPr>
-              <a:t>Online Repositories</a:t>
-            </a:r>
-            <a:r>
-              <a:rPr/>
-              <a:t> (Dryad, Genbank,GBIF, GEOME, new ones all the time)</a:t>
+              <a:t>Gandrud 2014</a:t>
             </a:r>
           </a:p>
         </p:txBody>
@@ -8330,18 +9254,110 @@
       </p:grpSpPr>
       <p:sp>
         <p:nvSpPr>
-          <p:cNvPr id="4" name="Text Placeholder 3"/>
-          <p:cNvSpPr>
-            <a:spLocks noGrp="1"/>
-          </p:cNvSpPr>
-          <p:nvPr>
-            <p:ph idx="2" sz="half" type="body"/>
-          </p:nvPr>
-        </p:nvSpPr>
-        <p:spPr/>
+          <p:cNvPr id="2" name="Title 1"/>
+          <p:cNvSpPr>
+            <a:spLocks noGrp="1"/>
+          </p:cNvSpPr>
+          <p:nvPr>
+            <p:ph type="title"/>
+          </p:nvPr>
+        </p:nvSpPr>
+        <p:spPr>
+          <a:xfrm>
+            <a:off x="685800" y="2074333"/>
+            <a:ext cx="3680885" cy="1371600"/>
+          </a:xfrm>
+        </p:spPr>
         <p:txBody>
           <a:bodyPr/>
           <a:lstStyle/>
+          <a:p>
+            <a:pPr lvl="0" indent="0" marL="0">
+              <a:buNone/>
+            </a:pPr>
+            <a:r>
+              <a:rPr/>
+              <a:t>Tools for Research Reproducibility</a:t>
+            </a:r>
+          </a:p>
+        </p:txBody>
+      </p:sp>
+      <p:sp>
+        <p:nvSpPr>
+          <p:cNvPr id="4" name="Text Placeholder 3"/>
+          <p:cNvSpPr>
+            <a:spLocks noGrp="1"/>
+          </p:cNvSpPr>
+          <p:nvPr>
+            <p:ph idx="2" sz="half" type="body"/>
+          </p:nvPr>
+        </p:nvSpPr>
+        <p:spPr/>
+        <p:txBody>
+          <a:bodyPr/>
+          <a:lstStyle/>
+          <a:p>
+            <a:pPr lvl="0"/>
+            <a:r>
+              <a:rPr/>
+              <a:t>Open Source Everything</a:t>
+            </a:r>
+          </a:p>
+          <a:p>
+            <a:pPr lvl="0"/>
+            <a:r>
+              <a:rPr/>
+              <a:t>R language</a:t>
+            </a:r>
+          </a:p>
+          <a:p>
+            <a:pPr lvl="0"/>
+            <a:r>
+              <a:rPr/>
+              <a:t>Rstudio and knitR</a:t>
+            </a:r>
+          </a:p>
+          <a:p>
+            <a:pPr lvl="0"/>
+            <a:r>
+              <a:rPr/>
+              <a:t>Markdown and LaTeX</a:t>
+            </a:r>
+          </a:p>
+          <a:p>
+            <a:pPr lvl="0"/>
+            <a:r>
+              <a:rPr/>
+              <a:t>Unix operating system</a:t>
+            </a:r>
+          </a:p>
+          <a:p>
+            <a:pPr lvl="0"/>
+            <a:r>
+              <a:rPr/>
+              <a:t>GitHub and git - version control (not covered in this class)</a:t>
+            </a:r>
+          </a:p>
+          <a:p>
+            <a:pPr lvl="0"/>
+            <a:r>
+              <a:rPr/>
+              <a:t>Creative Commons Licensing</a:t>
+            </a:r>
+          </a:p>
+          <a:p>
+            <a:pPr lvl="0"/>
+            <a:r>
+              <a:rPr>
+                <a:hlinkClick r:id="rId2"/>
+              </a:rPr>
+              <a:t>Online Repositories</a:t>
+            </a:r>
+            <a:r>
+              <a:rPr/>
+              <a:t> (Dryad, Genbank,GBIF, GEOME, new ones all the time)</a:t>
+            </a:r>
+          </a:p>
           <a:p>
             <a:pPr lvl="0" indent="0" marL="0">
               <a:spcBef>
@@ -8351,7 +9367,7 @@
             </a:pPr>
             <a:r>
               <a:rPr b="1"/>
-              <a:t>Open Science</a:t>
+              <a:t>Reproducible Research Habits</a:t>
             </a:r>
           </a:p>
           <a:p>
@@ -8359,53 +9375,266 @@
               <a:buNone/>
             </a:pPr>
             <a:r>
+              <a:rPr/>
+              <a:t>Good habits to get into as a student!</a:t>
+            </a:r>
+          </a:p>
+          <a:p>
+            <a:pPr lvl="0" indent="0" marL="0">
+              <a:buNone/>
+            </a:pPr>
+            <a:r>
               <a:rPr>
-                <a:hlinkClick r:id="rId2"/>
+                <a:hlinkClick r:id="rId3"/>
               </a:rPr>
-              <a:t>Open Science Links</a:t>
-            </a:r>
-          </a:p>
-          <a:p>
-            <a:pPr lvl="0"/>
-            <a:r>
-              <a:rPr/>
-              <a:t>Open Data</a:t>
-            </a:r>
-          </a:p>
-          <a:p>
-            <a:pPr lvl="0"/>
-            <a:r>
-              <a:rPr/>
-              <a:t>Reproducible Methods</a:t>
-            </a:r>
-          </a:p>
-          <a:p>
-            <a:pPr lvl="0"/>
-            <a:r>
-              <a:rPr/>
-              <a:t>Open Access Publications</a:t>
+              <a:t>10 Things Every Graduate Student Should Do</a:t>
+            </a:r>
+            <a:r>
+              <a:rPr/>
+              <a:t> By Carly Strasser</a:t>
+            </a:r>
+          </a:p>
+          <a:p>
+            <a:pPr lvl="0" indent="0" marL="0">
+              <a:spcBef>
+                <a:spcPts val="3000"/>
+              </a:spcBef>
+              <a:buNone/>
+            </a:pPr>
+            <a:r>
+              <a:rPr b="1"/>
+              <a:t>Stop Using Excel!</a:t>
+            </a:r>
+          </a:p>
+          <a:p>
+            <a:pPr lvl="0"/>
+            <a:r>
+              <a:rPr/>
+              <a:t>OK, maybe not entirely - its good for quick visualizing, data entry, etc.</a:t>
+            </a:r>
+          </a:p>
+          <a:p>
+            <a:pPr lvl="0"/>
+            <a:r>
+              <a:rPr/>
+              <a:t>It tends to be a crutch.</a:t>
+            </a:r>
+          </a:p>
+          <a:p>
+            <a:pPr lvl="1"/>
+            <a:r>
+              <a:rPr/>
+              <a:t>Stops you from thinking carefully about your data structure</a:t>
+            </a:r>
+          </a:p>
+          <a:p>
+            <a:pPr lvl="1"/>
+            <a:r>
+              <a:rPr/>
+              <a:t>Stops you from learning better ways to handle data</a:t>
+            </a:r>
+          </a:p>
+          <a:p>
+            <a:pPr lvl="0"/>
+            <a:r>
+              <a:rPr/>
+              <a:t>Proprietary software</a:t>
+            </a:r>
+          </a:p>
+          <a:p>
+            <a:pPr lvl="0"/>
+            <a:r>
+              <a:rPr/>
+              <a:t>Easy to mess up your data, no provenance</a:t>
+            </a:r>
+          </a:p>
+          <a:p>
+            <a:pPr lvl="0"/>
+            <a:r>
+              <a:rPr>
+                <a:hlinkClick r:id="rId4"/>
+              </a:rPr>
+              <a:t>Dates!</a:t>
+            </a:r>
+          </a:p>
+          <a:p>
+            <a:pPr lvl="0"/>
+            <a:r>
+              <a:rPr/>
+              <a:t>At least keep your raw data in text format</a:t>
+            </a:r>
+          </a:p>
+          <a:p>
+            <a:pPr lvl="0" indent="0" marL="0">
+              <a:spcBef>
+                <a:spcPts val="3000"/>
+              </a:spcBef>
+              <a:buNone/>
+            </a:pPr>
+            <a:r>
+              <a:rPr b="1"/>
+              <a:t>Learn to Code</a:t>
+            </a:r>
+          </a:p>
+          <a:p>
+            <a:pPr lvl="0" indent="0" marL="0">
+              <a:buNone/>
+            </a:pPr>
+            <a:r>
+              <a:rPr/>
+              <a:t>Any language.</a:t>
+            </a:r>
+          </a:p>
+          <a:p>
+            <a:pPr lvl="0" indent="0" marL="0">
+              <a:buNone/>
+            </a:pPr>
+            <a:r>
+              <a:rPr/>
+              <a:t>R is a great starting place.</a:t>
+            </a:r>
+          </a:p>
+          <a:p>
+            <a:pPr lvl="0" indent="0" marL="0">
+              <a:buNone/>
+            </a:pPr>
+            <a:r>
+              <a:rPr/>
+              <a:t>Here is code to paste cells from excel into an R data frame!</a:t>
+            </a:r>
+          </a:p>
+          <a:p>
+            <a:pPr lvl="0" indent="0">
+              <a:buNone/>
+            </a:pPr>
+            <a:r>
+              <a:rPr>
+                <a:latin typeface="Courier"/>
+              </a:rPr>
+              <a:t>data </a:t>
+            </a:r>
+            <a:r>
+              <a:rPr>
+                <a:solidFill>
+                  <a:srgbClr val="007020"/>
+                </a:solidFill>
+                <a:latin typeface="Courier"/>
+              </a:rPr>
+              <a:t>&lt;-</a:t>
+            </a:r>
+            <a:r>
+              <a:rPr>
+                <a:latin typeface="Courier"/>
+              </a:rPr>
+              <a:t> </a:t>
+            </a:r>
+            <a:r>
+              <a:rPr>
+                <a:solidFill>
+                  <a:srgbClr val="06287E"/>
+                </a:solidFill>
+                <a:latin typeface="Courier"/>
+              </a:rPr>
+              <a:t>read.table</a:t>
+            </a:r>
+            <a:r>
+              <a:rPr>
+                <a:latin typeface="Courier"/>
+              </a:rPr>
+              <a:t>(</a:t>
+            </a:r>
+            <a:r>
+              <a:rPr>
+                <a:solidFill>
+                  <a:srgbClr val="06287E"/>
+                </a:solidFill>
+                <a:latin typeface="Courier"/>
+              </a:rPr>
+              <a:t>pipe</a:t>
+            </a:r>
+            <a:r>
+              <a:rPr>
+                <a:latin typeface="Courier"/>
+              </a:rPr>
+              <a:t>(</a:t>
+            </a:r>
+            <a:r>
+              <a:rPr>
+                <a:solidFill>
+                  <a:srgbClr val="4070A0"/>
+                </a:solidFill>
+                <a:latin typeface="Courier"/>
+              </a:rPr>
+              <a:t>"pbpaste"</a:t>
+            </a:r>
+            <a:r>
+              <a:rPr>
+                <a:latin typeface="Courier"/>
+              </a:rPr>
+              <a:t>),</a:t>
+            </a:r>
+            <a:r>
+              <a:rPr>
+                <a:solidFill>
+                  <a:srgbClr val="7D9029"/>
+                </a:solidFill>
+                <a:latin typeface="Courier"/>
+              </a:rPr>
+              <a:t>header=</a:t>
+            </a:r>
+            <a:r>
+              <a:rPr>
+                <a:latin typeface="Courier"/>
+              </a:rPr>
+              <a:t>T) </a:t>
+            </a:r>
+          </a:p>
+          <a:p>
+            <a:pPr lvl="0" indent="0" marL="0">
+              <a:spcBef>
+                <a:spcPts val="3000"/>
+              </a:spcBef>
+              <a:buNone/>
+            </a:pPr>
+            <a:r>
+              <a:rPr b="1"/>
+              <a:t>Make a plan for managing data in each project</a:t>
+            </a:r>
+          </a:p>
+          <a:p>
+            <a:pPr lvl="0"/>
+            <a:r>
+              <a:rPr/>
+              <a:t>Keep all data (and ideally analyses) in a text file</a:t>
+            </a:r>
+          </a:p>
+          <a:p>
+            <a:pPr lvl="0"/>
+            <a:r>
+              <a:rPr/>
+              <a:t>Think about your file structure</a:t>
             </a:r>
           </a:p>
         </p:txBody>
       </p:sp>
       <p:pic>
         <p:nvPicPr>
-          <p:cNvPr descr="fig:  images/bigdata_nielsen_nature.png" id="0" name="Picture 1"/>
+          <p:cNvPr descr="images/gandrud_1.png" id="0" name="Picture 1"/>
           <p:cNvPicPr>
             <a:picLocks noGrp="1" noChangeAspect="1"/>
           </p:cNvPicPr>
           <p:nvPr/>
         </p:nvPicPr>
         <p:blipFill>
-          <a:blip r:embed="rId3"/>
+          <a:blip r:embed="rId5"/>
           <a:stretch>
             <a:fillRect/>
           </a:stretch>
         </p:blipFill>
         <p:spPr bwMode="auto">
           <a:xfrm>
-            <a:off x="4648200" y="1651000"/>
-            <a:ext cx="6159500" cy="2603500"/>
+            <a:off x="4648200" y="1422400"/>
+            <a:ext cx="6159500" cy="3048000"/>
           </a:xfrm>
           <a:prstGeom prst="rect">
             <a:avLst/>
@@ -8443,7 +9672,7 @@
             </a:pPr>
             <a:r>
               <a:rPr/>
-              <a:t>Big Data</a:t>
+              <a:t>Gandrud Figure 1</a:t>
             </a:r>
           </a:p>
         </p:txBody>

</xml_diff>